<commit_message>
design home screen and game screen
</commit_message>
<xml_diff>
--- a/design.pptx
+++ b/design.pptx
@@ -9,6 +9,10 @@
     <p:sldId id="257" r:id="rId3"/>
     <p:sldId id="258" r:id="rId4"/>
     <p:sldId id="259" r:id="rId5"/>
+    <p:sldId id="261" r:id="rId6"/>
+    <p:sldId id="263" r:id="rId7"/>
+    <p:sldId id="264" r:id="rId8"/>
+    <p:sldId id="265" r:id="rId9"/>
   </p:sldIdLst>
   <p:sldSz cx="12192000" cy="6858000"/>
   <p:notesSz cx="6858000" cy="9144000"/>
@@ -107,6 +111,11 @@
       </a:defRPr>
     </a:lvl9pPr>
   </p:defaultTextStyle>
+  <p:extLst>
+    <p:ext uri="{EFAFB233-063F-42B5-8137-9DF3F51BA10A}">
+      <p15:sldGuideLst xmlns:p15="http://schemas.microsoft.com/office/powerpoint/2012/main"/>
+    </p:ext>
+  </p:extLst>
 </p:presentation>
 </file>
 
@@ -6140,6 +6149,4394 @@
     <p:extLst>
       <p:ext uri="{BB962C8B-B14F-4D97-AF65-F5344CB8AC3E}">
         <p14:creationId xmlns:p14="http://schemas.microsoft.com/office/powerpoint/2010/main" val="449598688"/>
+      </p:ext>
+    </p:extLst>
+  </p:cSld>
+  <p:clrMapOvr>
+    <a:masterClrMapping/>
+  </p:clrMapOvr>
+</p:sld>
+</file>
+
+<file path=ppt/slides/slide5.xml><?xml version="1.0" encoding="utf-8"?>
+<p:sld xmlns:a="http://schemas.openxmlformats.org/drawingml/2006/main" xmlns:r="http://schemas.openxmlformats.org/officeDocument/2006/relationships" xmlns:p="http://schemas.openxmlformats.org/presentationml/2006/main">
+  <p:cSld>
+    <p:spTree>
+      <p:nvGrpSpPr>
+        <p:cNvPr id="1" name="">
+          <a:extLst>
+            <a:ext uri="{FF2B5EF4-FFF2-40B4-BE49-F238E27FC236}">
+              <a16:creationId xmlns:a16="http://schemas.microsoft.com/office/drawing/2014/main" id="{1B5C477A-C645-25DB-6492-039FADB92DAF}"/>
+            </a:ext>
+          </a:extLst>
+        </p:cNvPr>
+        <p:cNvGrpSpPr/>
+        <p:nvPr/>
+      </p:nvGrpSpPr>
+      <p:grpSpPr>
+        <a:xfrm>
+          <a:off x="0" y="0"/>
+          <a:ext cx="0" cy="0"/>
+          <a:chOff x="0" y="0"/>
+          <a:chExt cx="0" cy="0"/>
+        </a:xfrm>
+      </p:grpSpPr>
+      <p:sp>
+        <p:nvSpPr>
+          <p:cNvPr id="11" name="Rectangle 10">
+            <a:extLst>
+              <a:ext uri="{FF2B5EF4-FFF2-40B4-BE49-F238E27FC236}">
+                <a16:creationId xmlns:a16="http://schemas.microsoft.com/office/drawing/2014/main" id="{2E15BCBC-D7D4-75A7-1CD3-9FB40B39F71B}"/>
+              </a:ext>
+            </a:extLst>
+          </p:cNvPr>
+          <p:cNvSpPr/>
+          <p:nvPr/>
+        </p:nvSpPr>
+        <p:spPr>
+          <a:xfrm>
+            <a:off x="5538744" y="30478"/>
+            <a:ext cx="3327464" cy="6845378"/>
+          </a:xfrm>
+          <a:prstGeom prst="rect">
+            <a:avLst/>
+          </a:prstGeom>
+          <a:gradFill flip="none" rotWithShape="1">
+            <a:gsLst>
+              <a:gs pos="100000">
+                <a:srgbClr val="FFB5C1"/>
+              </a:gs>
+              <a:gs pos="0">
+                <a:srgbClr val="FCE3E9"/>
+              </a:gs>
+              <a:gs pos="100000">
+                <a:srgbClr val="FF617B"/>
+              </a:gs>
+            </a:gsLst>
+            <a:lin ang="2700000" scaled="1"/>
+            <a:tileRect/>
+          </a:gradFill>
+          <a:ln>
+            <a:solidFill>
+              <a:schemeClr val="accent1">
+                <a:shade val="15000"/>
+              </a:schemeClr>
+            </a:solidFill>
+          </a:ln>
+        </p:spPr>
+        <p:style>
+          <a:lnRef idx="2">
+            <a:schemeClr val="accent1">
+              <a:shade val="15000"/>
+            </a:schemeClr>
+          </a:lnRef>
+          <a:fillRef idx="1">
+            <a:schemeClr val="accent1"/>
+          </a:fillRef>
+          <a:effectRef idx="0">
+            <a:schemeClr val="accent1"/>
+          </a:effectRef>
+          <a:fontRef idx="minor">
+            <a:schemeClr val="lt1"/>
+          </a:fontRef>
+        </p:style>
+        <p:txBody>
+          <a:bodyPr rtlCol="0" anchor="ctr"/>
+          <a:lstStyle/>
+          <a:p>
+            <a:pPr algn="ctr"/>
+            <a:endParaRPr lang="en-US" dirty="0"/>
+          </a:p>
+        </p:txBody>
+      </p:sp>
+      <p:sp>
+        <p:nvSpPr>
+          <p:cNvPr id="12" name="Oval 11">
+            <a:extLst>
+              <a:ext uri="{FF2B5EF4-FFF2-40B4-BE49-F238E27FC236}">
+                <a16:creationId xmlns:a16="http://schemas.microsoft.com/office/drawing/2014/main" id="{41B7BF1F-0DC2-5CA7-ADA3-68A1B5016FAF}"/>
+              </a:ext>
+            </a:extLst>
+          </p:cNvPr>
+          <p:cNvSpPr/>
+          <p:nvPr/>
+        </p:nvSpPr>
+        <p:spPr>
+          <a:xfrm>
+            <a:off x="4485310" y="702586"/>
+            <a:ext cx="2985670" cy="2229684"/>
+          </a:xfrm>
+          <a:prstGeom prst="ellipse">
+            <a:avLst/>
+          </a:prstGeom>
+          <a:solidFill>
+            <a:srgbClr val="FCE3E9"/>
+          </a:solidFill>
+          <a:ln>
+            <a:noFill/>
+          </a:ln>
+        </p:spPr>
+        <p:style>
+          <a:lnRef idx="2">
+            <a:schemeClr val="accent1">
+              <a:shade val="15000"/>
+            </a:schemeClr>
+          </a:lnRef>
+          <a:fillRef idx="1">
+            <a:schemeClr val="accent1"/>
+          </a:fillRef>
+          <a:effectRef idx="0">
+            <a:schemeClr val="accent1"/>
+          </a:effectRef>
+          <a:fontRef idx="minor">
+            <a:schemeClr val="lt1"/>
+          </a:fontRef>
+        </p:style>
+        <p:txBody>
+          <a:bodyPr rtlCol="0" anchor="ctr"/>
+          <a:lstStyle/>
+          <a:p>
+            <a:pPr algn="ctr"/>
+            <a:endParaRPr lang="en-US" dirty="0"/>
+          </a:p>
+        </p:txBody>
+      </p:sp>
+      <p:sp>
+        <p:nvSpPr>
+          <p:cNvPr id="13" name="Oval 12">
+            <a:extLst>
+              <a:ext uri="{FF2B5EF4-FFF2-40B4-BE49-F238E27FC236}">
+                <a16:creationId xmlns:a16="http://schemas.microsoft.com/office/drawing/2014/main" id="{885C2CE9-7CA4-B733-21A4-B887D9F3720E}"/>
+              </a:ext>
+            </a:extLst>
+          </p:cNvPr>
+          <p:cNvSpPr/>
+          <p:nvPr/>
+        </p:nvSpPr>
+        <p:spPr>
+          <a:xfrm>
+            <a:off x="6376483" y="1252664"/>
+            <a:ext cx="4783184" cy="4544285"/>
+          </a:xfrm>
+          <a:prstGeom prst="ellipse">
+            <a:avLst/>
+          </a:prstGeom>
+          <a:solidFill>
+            <a:srgbClr val="FCE3E9"/>
+          </a:solidFill>
+          <a:ln>
+            <a:noFill/>
+          </a:ln>
+        </p:spPr>
+        <p:style>
+          <a:lnRef idx="2">
+            <a:schemeClr val="accent1">
+              <a:shade val="15000"/>
+            </a:schemeClr>
+          </a:lnRef>
+          <a:fillRef idx="1">
+            <a:schemeClr val="accent1"/>
+          </a:fillRef>
+          <a:effectRef idx="0">
+            <a:schemeClr val="accent1"/>
+          </a:effectRef>
+          <a:fontRef idx="minor">
+            <a:schemeClr val="lt1"/>
+          </a:fontRef>
+        </p:style>
+        <p:txBody>
+          <a:bodyPr rtlCol="0" anchor="ctr"/>
+          <a:lstStyle/>
+          <a:p>
+            <a:pPr algn="ctr"/>
+            <a:endParaRPr lang="en-US" dirty="0"/>
+          </a:p>
+        </p:txBody>
+      </p:sp>
+      <p:sp>
+        <p:nvSpPr>
+          <p:cNvPr id="14" name="Oval 13">
+            <a:extLst>
+              <a:ext uri="{FF2B5EF4-FFF2-40B4-BE49-F238E27FC236}">
+                <a16:creationId xmlns:a16="http://schemas.microsoft.com/office/drawing/2014/main" id="{741C47BF-E9C6-F585-1F4E-E17FD691E877}"/>
+              </a:ext>
+            </a:extLst>
+          </p:cNvPr>
+          <p:cNvSpPr/>
+          <p:nvPr/>
+        </p:nvSpPr>
+        <p:spPr>
+          <a:xfrm>
+            <a:off x="4526696" y="4479152"/>
+            <a:ext cx="4818960" cy="4022035"/>
+          </a:xfrm>
+          <a:prstGeom prst="ellipse">
+            <a:avLst/>
+          </a:prstGeom>
+          <a:solidFill>
+            <a:srgbClr val="FFD5DE"/>
+          </a:solidFill>
+          <a:ln>
+            <a:noFill/>
+          </a:ln>
+        </p:spPr>
+        <p:style>
+          <a:lnRef idx="2">
+            <a:schemeClr val="accent1">
+              <a:shade val="15000"/>
+            </a:schemeClr>
+          </a:lnRef>
+          <a:fillRef idx="1">
+            <a:schemeClr val="accent1"/>
+          </a:fillRef>
+          <a:effectRef idx="0">
+            <a:schemeClr val="accent1"/>
+          </a:effectRef>
+          <a:fontRef idx="minor">
+            <a:schemeClr val="lt1"/>
+          </a:fontRef>
+        </p:style>
+        <p:txBody>
+          <a:bodyPr rtlCol="0" anchor="ctr"/>
+          <a:lstStyle/>
+          <a:p>
+            <a:pPr algn="ctr"/>
+            <a:endParaRPr lang="en-US" dirty="0"/>
+          </a:p>
+        </p:txBody>
+      </p:sp>
+      <p:sp>
+        <p:nvSpPr>
+          <p:cNvPr id="2" name="Rectangle 1">
+            <a:extLst>
+              <a:ext uri="{FF2B5EF4-FFF2-40B4-BE49-F238E27FC236}">
+                <a16:creationId xmlns:a16="http://schemas.microsoft.com/office/drawing/2014/main" id="{CC4451B4-47F3-32DB-C5F3-1C5F58EE3A6B}"/>
+              </a:ext>
+            </a:extLst>
+          </p:cNvPr>
+          <p:cNvSpPr/>
+          <p:nvPr/>
+        </p:nvSpPr>
+        <p:spPr>
+          <a:xfrm>
+            <a:off x="2846344" y="30480"/>
+            <a:ext cx="2692400" cy="6974093"/>
+          </a:xfrm>
+          <a:prstGeom prst="rect">
+            <a:avLst/>
+          </a:prstGeom>
+          <a:solidFill>
+            <a:schemeClr val="bg1"/>
+          </a:solidFill>
+        </p:spPr>
+        <p:style>
+          <a:lnRef idx="2">
+            <a:schemeClr val="accent1">
+              <a:shade val="15000"/>
+            </a:schemeClr>
+          </a:lnRef>
+          <a:fillRef idx="1">
+            <a:schemeClr val="accent1"/>
+          </a:fillRef>
+          <a:effectRef idx="0">
+            <a:schemeClr val="accent1"/>
+          </a:effectRef>
+          <a:fontRef idx="minor">
+            <a:schemeClr val="lt1"/>
+          </a:fontRef>
+        </p:style>
+        <p:txBody>
+          <a:bodyPr rtlCol="0" anchor="ctr"/>
+          <a:lstStyle/>
+          <a:p>
+            <a:pPr algn="ctr"/>
+            <a:endParaRPr lang="en-US"/>
+          </a:p>
+        </p:txBody>
+      </p:sp>
+      <p:sp>
+        <p:nvSpPr>
+          <p:cNvPr id="3" name="Rectangle 2">
+            <a:extLst>
+              <a:ext uri="{FF2B5EF4-FFF2-40B4-BE49-F238E27FC236}">
+                <a16:creationId xmlns:a16="http://schemas.microsoft.com/office/drawing/2014/main" id="{20FFADA7-A414-0FEB-9E87-BEBE2DC74CDE}"/>
+              </a:ext>
+            </a:extLst>
+          </p:cNvPr>
+          <p:cNvSpPr/>
+          <p:nvPr/>
+        </p:nvSpPr>
+        <p:spPr>
+          <a:xfrm>
+            <a:off x="3567146" y="6875855"/>
+            <a:ext cx="6172224" cy="2436957"/>
+          </a:xfrm>
+          <a:prstGeom prst="rect">
+            <a:avLst/>
+          </a:prstGeom>
+          <a:solidFill>
+            <a:schemeClr val="bg1"/>
+          </a:solidFill>
+        </p:spPr>
+        <p:style>
+          <a:lnRef idx="2">
+            <a:schemeClr val="accent1">
+              <a:shade val="15000"/>
+            </a:schemeClr>
+          </a:lnRef>
+          <a:fillRef idx="1">
+            <a:schemeClr val="accent1"/>
+          </a:fillRef>
+          <a:effectRef idx="0">
+            <a:schemeClr val="accent1"/>
+          </a:effectRef>
+          <a:fontRef idx="minor">
+            <a:schemeClr val="lt1"/>
+          </a:fontRef>
+        </p:style>
+        <p:txBody>
+          <a:bodyPr rtlCol="0" anchor="ctr"/>
+          <a:lstStyle/>
+          <a:p>
+            <a:pPr algn="ctr"/>
+            <a:endParaRPr lang="en-US"/>
+          </a:p>
+        </p:txBody>
+      </p:sp>
+      <p:sp>
+        <p:nvSpPr>
+          <p:cNvPr id="5" name="Rectangle 4">
+            <a:extLst>
+              <a:ext uri="{FF2B5EF4-FFF2-40B4-BE49-F238E27FC236}">
+                <a16:creationId xmlns:a16="http://schemas.microsoft.com/office/drawing/2014/main" id="{43403EB1-81B3-0DB1-BD59-D1C98D062E2A}"/>
+              </a:ext>
+            </a:extLst>
+          </p:cNvPr>
+          <p:cNvSpPr/>
+          <p:nvPr/>
+        </p:nvSpPr>
+        <p:spPr>
+          <a:xfrm>
+            <a:off x="8866207" y="30478"/>
+            <a:ext cx="3880631" cy="6845376"/>
+          </a:xfrm>
+          <a:prstGeom prst="rect">
+            <a:avLst/>
+          </a:prstGeom>
+          <a:solidFill>
+            <a:schemeClr val="bg1"/>
+          </a:solidFill>
+        </p:spPr>
+        <p:style>
+          <a:lnRef idx="2">
+            <a:schemeClr val="accent1">
+              <a:shade val="15000"/>
+            </a:schemeClr>
+          </a:lnRef>
+          <a:fillRef idx="1">
+            <a:schemeClr val="accent1"/>
+          </a:fillRef>
+          <a:effectRef idx="0">
+            <a:schemeClr val="accent1"/>
+          </a:effectRef>
+          <a:fontRef idx="minor">
+            <a:schemeClr val="lt1"/>
+          </a:fontRef>
+        </p:style>
+        <p:txBody>
+          <a:bodyPr rtlCol="0" anchor="ctr"/>
+          <a:lstStyle/>
+          <a:p>
+            <a:pPr algn="ctr"/>
+            <a:endParaRPr lang="en-US"/>
+          </a:p>
+        </p:txBody>
+      </p:sp>
+      <p:grpSp>
+        <p:nvGrpSpPr>
+          <p:cNvPr id="22" name="Group 21">
+            <a:extLst>
+              <a:ext uri="{FF2B5EF4-FFF2-40B4-BE49-F238E27FC236}">
+                <a16:creationId xmlns:a16="http://schemas.microsoft.com/office/drawing/2014/main" id="{BDB4606D-4369-8D80-28BC-16DD210D6C9F}"/>
+              </a:ext>
+            </a:extLst>
+          </p:cNvPr>
+          <p:cNvGrpSpPr/>
+          <p:nvPr/>
+        </p:nvGrpSpPr>
+        <p:grpSpPr>
+          <a:xfrm>
+            <a:off x="5898926" y="722633"/>
+            <a:ext cx="3623557" cy="2211876"/>
+            <a:chOff x="6080390" y="166973"/>
+            <a:chExt cx="3623557" cy="2211876"/>
+          </a:xfrm>
+        </p:grpSpPr>
+        <p:grpSp>
+          <p:nvGrpSpPr>
+            <p:cNvPr id="21" name="Group 20">
+              <a:extLst>
+                <a:ext uri="{FF2B5EF4-FFF2-40B4-BE49-F238E27FC236}">
+                  <a16:creationId xmlns:a16="http://schemas.microsoft.com/office/drawing/2014/main" id="{6774CDB5-F715-BF9F-2408-260611FE8227}"/>
+                </a:ext>
+              </a:extLst>
+            </p:cNvPr>
+            <p:cNvGrpSpPr/>
+            <p:nvPr/>
+          </p:nvGrpSpPr>
+          <p:grpSpPr>
+            <a:xfrm>
+              <a:off x="6096000" y="166973"/>
+              <a:ext cx="3206789" cy="2211876"/>
+              <a:chOff x="9691415" y="624269"/>
+              <a:chExt cx="3206789" cy="2211876"/>
+            </a:xfrm>
+          </p:grpSpPr>
+          <p:sp>
+            <p:nvSpPr>
+              <p:cNvPr id="18" name="Freeform: Shape 17">
+                <a:extLst>
+                  <a:ext uri="{FF2B5EF4-FFF2-40B4-BE49-F238E27FC236}">
+                    <a16:creationId xmlns:a16="http://schemas.microsoft.com/office/drawing/2014/main" id="{0095447B-819A-998B-A0F3-822B30D5725D}"/>
+                  </a:ext>
+                </a:extLst>
+              </p:cNvPr>
+              <p:cNvSpPr/>
+              <p:nvPr/>
+            </p:nvSpPr>
+            <p:spPr>
+              <a:xfrm>
+                <a:off x="9691415" y="624269"/>
+                <a:ext cx="2748954" cy="2211876"/>
+              </a:xfrm>
+              <a:custGeom>
+                <a:avLst/>
+                <a:gdLst>
+                  <a:gd name="connsiteX0" fmla="*/ 262210 w 2748954"/>
+                  <a:gd name="connsiteY0" fmla="*/ 223456 h 2211876"/>
+                  <a:gd name="connsiteX1" fmla="*/ 262210 w 2748954"/>
+                  <a:gd name="connsiteY1" fmla="*/ 1909381 h 2211876"/>
+                  <a:gd name="connsiteX2" fmla="*/ 2662510 w 2748954"/>
+                  <a:gd name="connsiteY2" fmla="*/ 2052256 h 2211876"/>
+                  <a:gd name="connsiteX3" fmla="*/ 2033860 w 2748954"/>
+                  <a:gd name="connsiteY3" fmla="*/ 213931 h 2211876"/>
+                  <a:gd name="connsiteX4" fmla="*/ 262210 w 2748954"/>
+                  <a:gd name="connsiteY4" fmla="*/ 223456 h 2211876"/>
+                </a:gdLst>
+                <a:ahLst/>
+                <a:cxnLst>
+                  <a:cxn ang="0">
+                    <a:pos x="connsiteX0" y="connsiteY0"/>
+                  </a:cxn>
+                  <a:cxn ang="0">
+                    <a:pos x="connsiteX1" y="connsiteY1"/>
+                  </a:cxn>
+                  <a:cxn ang="0">
+                    <a:pos x="connsiteX2" y="connsiteY2"/>
+                  </a:cxn>
+                  <a:cxn ang="0">
+                    <a:pos x="connsiteX3" y="connsiteY3"/>
+                  </a:cxn>
+                  <a:cxn ang="0">
+                    <a:pos x="connsiteX4" y="connsiteY4"/>
+                  </a:cxn>
+                </a:cxnLst>
+                <a:rect l="l" t="t" r="r" b="b"/>
+                <a:pathLst>
+                  <a:path w="2748954" h="2211876">
+                    <a:moveTo>
+                      <a:pt x="262210" y="223456"/>
+                    </a:moveTo>
+                    <a:cubicBezTo>
+                      <a:pt x="-33065" y="506031"/>
+                      <a:pt x="-137840" y="1604581"/>
+                      <a:pt x="262210" y="1909381"/>
+                    </a:cubicBezTo>
+                    <a:cubicBezTo>
+                      <a:pt x="662260" y="2214181"/>
+                      <a:pt x="2367235" y="2334831"/>
+                      <a:pt x="2662510" y="2052256"/>
+                    </a:cubicBezTo>
+                    <a:cubicBezTo>
+                      <a:pt x="2957785" y="1769681"/>
+                      <a:pt x="2433910" y="513968"/>
+                      <a:pt x="2033860" y="213931"/>
+                    </a:cubicBezTo>
+                    <a:cubicBezTo>
+                      <a:pt x="1633810" y="-86106"/>
+                      <a:pt x="557485" y="-59119"/>
+                      <a:pt x="262210" y="223456"/>
+                    </a:cubicBezTo>
+                    <a:close/>
+                  </a:path>
+                </a:pathLst>
+              </a:custGeom>
+              <a:solidFill>
+                <a:schemeClr val="bg1"/>
+              </a:solidFill>
+            </p:spPr>
+            <p:style>
+              <a:lnRef idx="2">
+                <a:schemeClr val="accent1">
+                  <a:shade val="15000"/>
+                </a:schemeClr>
+              </a:lnRef>
+              <a:fillRef idx="1">
+                <a:schemeClr val="accent1"/>
+              </a:fillRef>
+              <a:effectRef idx="0">
+                <a:schemeClr val="accent1"/>
+              </a:effectRef>
+              <a:fontRef idx="minor">
+                <a:schemeClr val="lt1"/>
+              </a:fontRef>
+            </p:style>
+            <p:txBody>
+              <a:bodyPr rtlCol="0" anchor="ctr"/>
+              <a:lstStyle/>
+              <a:p>
+                <a:pPr algn="ctr"/>
+                <a:endParaRPr lang="en-US"/>
+              </a:p>
+            </p:txBody>
+          </p:sp>
+          <p:sp>
+            <p:nvSpPr>
+              <p:cNvPr id="20" name="TextBox 19">
+                <a:extLst>
+                  <a:ext uri="{FF2B5EF4-FFF2-40B4-BE49-F238E27FC236}">
+                    <a16:creationId xmlns:a16="http://schemas.microsoft.com/office/drawing/2014/main" id="{BB3B4463-03CA-1D26-8470-256911608170}"/>
+                  </a:ext>
+                </a:extLst>
+              </p:cNvPr>
+              <p:cNvSpPr txBox="1"/>
+              <p:nvPr/>
+            </p:nvSpPr>
+            <p:spPr>
+              <a:xfrm>
+                <a:off x="10587920" y="1709961"/>
+                <a:ext cx="2310284" cy="663233"/>
+              </a:xfrm>
+              <a:prstGeom prst="rect">
+                <a:avLst/>
+              </a:prstGeom>
+              <a:noFill/>
+            </p:spPr>
+            <p:txBody>
+              <a:bodyPr wrap="square" rtlCol="0">
+                <a:spAutoFit/>
+              </a:bodyPr>
+              <a:lstStyle/>
+              <a:p>
+                <a:r>
+                  <a:rPr lang="en-US" sz="4000" dirty="0">
+                    <a:latin typeface="Algerian" panose="04020705040A02060702" pitchFamily="82" charset="0"/>
+                  </a:rPr>
+                  <a:t>HH</a:t>
+                </a:r>
+              </a:p>
+            </p:txBody>
+          </p:sp>
+        </p:grpSp>
+        <p:sp>
+          <p:nvSpPr>
+            <p:cNvPr id="19" name="TextBox 18">
+              <a:extLst>
+                <a:ext uri="{FF2B5EF4-FFF2-40B4-BE49-F238E27FC236}">
+                  <a16:creationId xmlns:a16="http://schemas.microsoft.com/office/drawing/2014/main" id="{E4DCB609-58B4-DAB5-243D-F4623A2855BE}"/>
+                </a:ext>
+              </a:extLst>
+            </p:cNvPr>
+            <p:cNvSpPr txBox="1"/>
+            <p:nvPr/>
+          </p:nvSpPr>
+          <p:spPr>
+            <a:xfrm>
+              <a:off x="6080390" y="583899"/>
+              <a:ext cx="3623557" cy="778578"/>
+            </a:xfrm>
+            <a:prstGeom prst="rect">
+              <a:avLst/>
+            </a:prstGeom>
+            <a:noFill/>
+          </p:spPr>
+          <p:txBody>
+            <a:bodyPr wrap="square" rtlCol="0">
+              <a:spAutoFit/>
+            </a:bodyPr>
+            <a:lstStyle/>
+            <a:p>
+              <a:r>
+                <a:rPr lang="en-US" sz="4800" b="1" dirty="0">
+                  <a:latin typeface="Bauhaus 93" panose="04030905020B02020C02" pitchFamily="82" charset="0"/>
+                </a:rPr>
+                <a:t>SUDOKU</a:t>
+              </a:r>
+            </a:p>
+          </p:txBody>
+        </p:sp>
+      </p:grpSp>
+      <p:sp>
+        <p:nvSpPr>
+          <p:cNvPr id="26" name="TextBox 25">
+            <a:extLst>
+              <a:ext uri="{FF2B5EF4-FFF2-40B4-BE49-F238E27FC236}">
+                <a16:creationId xmlns:a16="http://schemas.microsoft.com/office/drawing/2014/main" id="{0FBC14ED-7714-62F0-3A46-964F9C085EC9}"/>
+              </a:ext>
+            </a:extLst>
+          </p:cNvPr>
+          <p:cNvSpPr txBox="1"/>
+          <p:nvPr/>
+        </p:nvSpPr>
+        <p:spPr>
+          <a:xfrm>
+            <a:off x="5625049" y="2091861"/>
+            <a:ext cx="1211434" cy="830997"/>
+          </a:xfrm>
+          <a:prstGeom prst="rect">
+            <a:avLst/>
+          </a:prstGeom>
+          <a:noFill/>
+          <a:effectLst>
+            <a:outerShdw blurRad="190500" dist="38100" algn="l" rotWithShape="0">
+              <a:prstClr val="black">
+                <a:alpha val="28000"/>
+              </a:prstClr>
+            </a:outerShdw>
+            <a:softEdge rad="127000"/>
+          </a:effectLst>
+          <a:scene3d>
+            <a:camera prst="isometricRightUp">
+              <a:rot lat="1200000" lon="21594000" rev="2400000"/>
+            </a:camera>
+            <a:lightRig rig="threePt" dir="t"/>
+          </a:scene3d>
+        </p:spPr>
+        <p:txBody>
+          <a:bodyPr wrap="square" rtlCol="0">
+            <a:spAutoFit/>
+          </a:bodyPr>
+          <a:lstStyle/>
+          <a:p>
+            <a:r>
+              <a:rPr lang="en-US" sz="4800" b="1" dirty="0">
+                <a:solidFill>
+                  <a:schemeClr val="bg1"/>
+                </a:solidFill>
+                <a:latin typeface="ADLaM Display" panose="02010000000000000000" pitchFamily="2" charset="0"/>
+                <a:ea typeface="ADLaM Display" panose="02010000000000000000" pitchFamily="2" charset="0"/>
+                <a:cs typeface="ADLaM Display" panose="02010000000000000000" pitchFamily="2" charset="0"/>
+              </a:rPr>
+              <a:t>2</a:t>
+            </a:r>
+          </a:p>
+        </p:txBody>
+      </p:sp>
+      <p:sp>
+        <p:nvSpPr>
+          <p:cNvPr id="23" name="TextBox 22">
+            <a:extLst>
+              <a:ext uri="{FF2B5EF4-FFF2-40B4-BE49-F238E27FC236}">
+                <a16:creationId xmlns:a16="http://schemas.microsoft.com/office/drawing/2014/main" id="{23E1B93B-9CD4-D545-D06E-B83914011B29}"/>
+              </a:ext>
+            </a:extLst>
+          </p:cNvPr>
+          <p:cNvSpPr txBox="1"/>
+          <p:nvPr/>
+        </p:nvSpPr>
+        <p:spPr>
+          <a:xfrm>
+            <a:off x="5492782" y="5746559"/>
+            <a:ext cx="1211434" cy="830997"/>
+          </a:xfrm>
+          <a:prstGeom prst="rect">
+            <a:avLst/>
+          </a:prstGeom>
+          <a:noFill/>
+          <a:effectLst>
+            <a:outerShdw blurRad="190500" dist="38100" algn="l" rotWithShape="0">
+              <a:prstClr val="black">
+                <a:alpha val="28000"/>
+              </a:prstClr>
+            </a:outerShdw>
+            <a:softEdge rad="127000"/>
+          </a:effectLst>
+          <a:scene3d>
+            <a:camera prst="isometricRightUp">
+              <a:rot lat="1800000" lon="20400000" rev="600000"/>
+            </a:camera>
+            <a:lightRig rig="threePt" dir="t"/>
+          </a:scene3d>
+        </p:spPr>
+        <p:txBody>
+          <a:bodyPr wrap="square" rtlCol="0">
+            <a:spAutoFit/>
+          </a:bodyPr>
+          <a:lstStyle/>
+          <a:p>
+            <a:r>
+              <a:rPr lang="en-US" sz="4800" b="1" dirty="0">
+                <a:solidFill>
+                  <a:schemeClr val="bg1"/>
+                </a:solidFill>
+                <a:latin typeface="ADLaM Display" panose="02010000000000000000" pitchFamily="2" charset="0"/>
+                <a:ea typeface="ADLaM Display" panose="02010000000000000000" pitchFamily="2" charset="0"/>
+                <a:cs typeface="ADLaM Display" panose="02010000000000000000" pitchFamily="2" charset="0"/>
+              </a:rPr>
+              <a:t>7</a:t>
+            </a:r>
+          </a:p>
+        </p:txBody>
+      </p:sp>
+      <p:sp>
+        <p:nvSpPr>
+          <p:cNvPr id="24" name="TextBox 23">
+            <a:extLst>
+              <a:ext uri="{FF2B5EF4-FFF2-40B4-BE49-F238E27FC236}">
+                <a16:creationId xmlns:a16="http://schemas.microsoft.com/office/drawing/2014/main" id="{5FF827F6-FABF-FFCF-E048-B61D14B64471}"/>
+              </a:ext>
+            </a:extLst>
+          </p:cNvPr>
+          <p:cNvSpPr txBox="1"/>
+          <p:nvPr/>
+        </p:nvSpPr>
+        <p:spPr>
+          <a:xfrm>
+            <a:off x="7822357" y="2540590"/>
+            <a:ext cx="1211434" cy="1323439"/>
+          </a:xfrm>
+          <a:prstGeom prst="rect">
+            <a:avLst/>
+          </a:prstGeom>
+          <a:noFill/>
+          <a:effectLst>
+            <a:outerShdw blurRad="190500" dist="38100" algn="l" rotWithShape="0">
+              <a:prstClr val="black">
+                <a:alpha val="28000"/>
+              </a:prstClr>
+            </a:outerShdw>
+            <a:softEdge rad="127000"/>
+          </a:effectLst>
+          <a:scene3d>
+            <a:camera prst="isometricRightUp">
+              <a:rot lat="9000000" lon="12000000" rev="9000000"/>
+            </a:camera>
+            <a:lightRig rig="threePt" dir="t"/>
+          </a:scene3d>
+        </p:spPr>
+        <p:txBody>
+          <a:bodyPr wrap="square" rtlCol="0">
+            <a:spAutoFit/>
+          </a:bodyPr>
+          <a:lstStyle/>
+          <a:p>
+            <a:r>
+              <a:rPr lang="en-US" sz="8000" b="1" dirty="0">
+                <a:solidFill>
+                  <a:schemeClr val="bg1"/>
+                </a:solidFill>
+                <a:latin typeface="ADLaM Display" panose="02010000000000000000" pitchFamily="2" charset="0"/>
+                <a:ea typeface="ADLaM Display" panose="02010000000000000000" pitchFamily="2" charset="0"/>
+                <a:cs typeface="ADLaM Display" panose="02010000000000000000" pitchFamily="2" charset="0"/>
+              </a:rPr>
+              <a:t>9</a:t>
+            </a:r>
+          </a:p>
+        </p:txBody>
+      </p:sp>
+      <p:sp>
+        <p:nvSpPr>
+          <p:cNvPr id="25" name="TextBox 24">
+            <a:extLst>
+              <a:ext uri="{FF2B5EF4-FFF2-40B4-BE49-F238E27FC236}">
+                <a16:creationId xmlns:a16="http://schemas.microsoft.com/office/drawing/2014/main" id="{0613618E-F13A-1B2D-D94C-57D3CF847712}"/>
+              </a:ext>
+            </a:extLst>
+          </p:cNvPr>
+          <p:cNvSpPr txBox="1"/>
+          <p:nvPr/>
+        </p:nvSpPr>
+        <p:spPr>
+          <a:xfrm>
+            <a:off x="7848335" y="4887614"/>
+            <a:ext cx="1211434" cy="830997"/>
+          </a:xfrm>
+          <a:prstGeom prst="rect">
+            <a:avLst/>
+          </a:prstGeom>
+          <a:noFill/>
+          <a:effectLst>
+            <a:outerShdw blurRad="190500" dist="38100" algn="l" rotWithShape="0">
+              <a:prstClr val="black">
+                <a:alpha val="28000"/>
+              </a:prstClr>
+            </a:outerShdw>
+            <a:softEdge rad="127000"/>
+          </a:effectLst>
+          <a:scene3d>
+            <a:camera prst="isometricRightUp">
+              <a:rot lat="9000000" lon="12000000" rev="1800000"/>
+            </a:camera>
+            <a:lightRig rig="threePt" dir="t"/>
+          </a:scene3d>
+        </p:spPr>
+        <p:txBody>
+          <a:bodyPr wrap="square" rtlCol="0">
+            <a:spAutoFit/>
+          </a:bodyPr>
+          <a:lstStyle/>
+          <a:p>
+            <a:r>
+              <a:rPr lang="en-US" sz="4800" b="1" dirty="0">
+                <a:solidFill>
+                  <a:schemeClr val="bg1"/>
+                </a:solidFill>
+                <a:latin typeface="ADLaM Display" panose="02010000000000000000" pitchFamily="2" charset="0"/>
+                <a:ea typeface="ADLaM Display" panose="02010000000000000000" pitchFamily="2" charset="0"/>
+                <a:cs typeface="ADLaM Display" panose="02010000000000000000" pitchFamily="2" charset="0"/>
+              </a:rPr>
+              <a:t>8</a:t>
+            </a:r>
+          </a:p>
+        </p:txBody>
+      </p:sp>
+      <p:sp>
+        <p:nvSpPr>
+          <p:cNvPr id="27" name="TextBox 26">
+            <a:extLst>
+              <a:ext uri="{FF2B5EF4-FFF2-40B4-BE49-F238E27FC236}">
+                <a16:creationId xmlns:a16="http://schemas.microsoft.com/office/drawing/2014/main" id="{7D6B25C5-7CA6-32AC-EFBC-CE19DD15AF32}"/>
+              </a:ext>
+            </a:extLst>
+          </p:cNvPr>
+          <p:cNvSpPr txBox="1"/>
+          <p:nvPr/>
+        </p:nvSpPr>
+        <p:spPr>
+          <a:xfrm>
+            <a:off x="6328539" y="2976594"/>
+            <a:ext cx="1211434" cy="830997"/>
+          </a:xfrm>
+          <a:prstGeom prst="rect">
+            <a:avLst/>
+          </a:prstGeom>
+          <a:noFill/>
+          <a:effectLst>
+            <a:outerShdw blurRad="38100" dist="558800" algn="l" rotWithShape="0">
+              <a:prstClr val="black">
+                <a:alpha val="93000"/>
+              </a:prstClr>
+            </a:outerShdw>
+            <a:softEdge rad="127000"/>
+          </a:effectLst>
+          <a:scene3d>
+            <a:camera prst="isometricRightUp">
+              <a:rot lat="2433751" lon="19169909" rev="1118621"/>
+            </a:camera>
+            <a:lightRig rig="threePt" dir="t"/>
+          </a:scene3d>
+        </p:spPr>
+        <p:txBody>
+          <a:bodyPr wrap="square" rtlCol="0">
+            <a:spAutoFit/>
+          </a:bodyPr>
+          <a:lstStyle/>
+          <a:p>
+            <a:r>
+              <a:rPr lang="en-US" sz="4800" b="1" dirty="0">
+                <a:solidFill>
+                  <a:schemeClr val="bg1"/>
+                </a:solidFill>
+                <a:latin typeface="ADLaM Display" panose="02010000000000000000" pitchFamily="2" charset="0"/>
+                <a:ea typeface="ADLaM Display" panose="02010000000000000000" pitchFamily="2" charset="0"/>
+                <a:cs typeface="ADLaM Display" panose="02010000000000000000" pitchFamily="2" charset="0"/>
+              </a:rPr>
+              <a:t>3</a:t>
+            </a:r>
+          </a:p>
+        </p:txBody>
+      </p:sp>
+      <p:sp>
+        <p:nvSpPr>
+          <p:cNvPr id="28" name="TextBox 27">
+            <a:extLst>
+              <a:ext uri="{FF2B5EF4-FFF2-40B4-BE49-F238E27FC236}">
+                <a16:creationId xmlns:a16="http://schemas.microsoft.com/office/drawing/2014/main" id="{071644E8-110C-4CDD-FF53-AAF3660A04BF}"/>
+              </a:ext>
+            </a:extLst>
+          </p:cNvPr>
+          <p:cNvSpPr txBox="1"/>
+          <p:nvPr/>
+        </p:nvSpPr>
+        <p:spPr>
+          <a:xfrm>
+            <a:off x="7782333" y="26579"/>
+            <a:ext cx="1211434" cy="400110"/>
+          </a:xfrm>
+          <a:prstGeom prst="rect">
+            <a:avLst/>
+          </a:prstGeom>
+          <a:noFill/>
+          <a:effectLst>
+            <a:outerShdw blurRad="190500" dist="38100" algn="l" rotWithShape="0">
+              <a:prstClr val="black">
+                <a:alpha val="28000"/>
+              </a:prstClr>
+            </a:outerShdw>
+            <a:softEdge rad="127000"/>
+          </a:effectLst>
+          <a:scene3d>
+            <a:camera prst="isometricRightUp">
+              <a:rot lat="0" lon="20400000" rev="0"/>
+            </a:camera>
+            <a:lightRig rig="threePt" dir="t"/>
+          </a:scene3d>
+        </p:spPr>
+        <p:txBody>
+          <a:bodyPr wrap="square" rtlCol="0">
+            <a:spAutoFit/>
+          </a:bodyPr>
+          <a:lstStyle/>
+          <a:p>
+            <a:r>
+              <a:rPr lang="en-US" sz="2000" b="1" dirty="0">
+                <a:solidFill>
+                  <a:schemeClr val="bg1"/>
+                </a:solidFill>
+                <a:latin typeface="ADLaM Display" panose="02010000000000000000" pitchFamily="2" charset="0"/>
+                <a:ea typeface="ADLaM Display" panose="02010000000000000000" pitchFamily="2" charset="0"/>
+                <a:cs typeface="ADLaM Display" panose="02010000000000000000" pitchFamily="2" charset="0"/>
+              </a:rPr>
+              <a:t>1</a:t>
+            </a:r>
+          </a:p>
+        </p:txBody>
+      </p:sp>
+      <p:sp>
+        <p:nvSpPr>
+          <p:cNvPr id="29" name="TextBox 28">
+            <a:extLst>
+              <a:ext uri="{FF2B5EF4-FFF2-40B4-BE49-F238E27FC236}">
+                <a16:creationId xmlns:a16="http://schemas.microsoft.com/office/drawing/2014/main" id="{C9C7D5FC-2405-0E13-A9C1-49C27D97716E}"/>
+              </a:ext>
+            </a:extLst>
+          </p:cNvPr>
+          <p:cNvSpPr txBox="1"/>
+          <p:nvPr/>
+        </p:nvSpPr>
+        <p:spPr>
+          <a:xfrm>
+            <a:off x="5728974" y="-91655"/>
+            <a:ext cx="1211434" cy="830997"/>
+          </a:xfrm>
+          <a:prstGeom prst="rect">
+            <a:avLst/>
+          </a:prstGeom>
+          <a:noFill/>
+          <a:effectLst>
+            <a:outerShdw blurRad="190500" dist="38100" algn="l" rotWithShape="0">
+              <a:prstClr val="black">
+                <a:alpha val="28000"/>
+              </a:prstClr>
+            </a:outerShdw>
+            <a:softEdge rad="127000"/>
+          </a:effectLst>
+          <a:scene3d>
+            <a:camera prst="isometricRightUp">
+              <a:rot lat="1800000" lon="20400000" rev="600000"/>
+            </a:camera>
+            <a:lightRig rig="threePt" dir="t"/>
+          </a:scene3d>
+        </p:spPr>
+        <p:txBody>
+          <a:bodyPr wrap="square" rtlCol="0">
+            <a:spAutoFit/>
+          </a:bodyPr>
+          <a:lstStyle/>
+          <a:p>
+            <a:r>
+              <a:rPr lang="en-US" sz="4800" b="1" dirty="0">
+                <a:solidFill>
+                  <a:schemeClr val="bg1"/>
+                </a:solidFill>
+                <a:latin typeface="ADLaM Display" panose="02010000000000000000" pitchFamily="2" charset="0"/>
+                <a:ea typeface="ADLaM Display" panose="02010000000000000000" pitchFamily="2" charset="0"/>
+                <a:cs typeface="ADLaM Display" panose="02010000000000000000" pitchFamily="2" charset="0"/>
+              </a:rPr>
+              <a:t>4</a:t>
+            </a:r>
+          </a:p>
+        </p:txBody>
+      </p:sp>
+      <p:sp>
+        <p:nvSpPr>
+          <p:cNvPr id="30" name="TextBox 29">
+            <a:extLst>
+              <a:ext uri="{FF2B5EF4-FFF2-40B4-BE49-F238E27FC236}">
+                <a16:creationId xmlns:a16="http://schemas.microsoft.com/office/drawing/2014/main" id="{53A4BE8E-3ABF-0180-9CF3-50D864BE0806}"/>
+              </a:ext>
+            </a:extLst>
+          </p:cNvPr>
+          <p:cNvSpPr txBox="1"/>
+          <p:nvPr/>
+        </p:nvSpPr>
+        <p:spPr>
+          <a:xfrm>
+            <a:off x="8243335" y="330954"/>
+            <a:ext cx="1211434" cy="1323439"/>
+          </a:xfrm>
+          <a:prstGeom prst="rect">
+            <a:avLst/>
+          </a:prstGeom>
+          <a:noFill/>
+          <a:effectLst>
+            <a:outerShdw blurRad="190500" dist="38100" algn="l" rotWithShape="0">
+              <a:prstClr val="black">
+                <a:alpha val="28000"/>
+              </a:prstClr>
+            </a:outerShdw>
+            <a:softEdge rad="127000"/>
+          </a:effectLst>
+          <a:scene3d>
+            <a:camera prst="isometricRightUp">
+              <a:rot lat="9000000" lon="12000000" rev="9000000"/>
+            </a:camera>
+            <a:lightRig rig="threePt" dir="t"/>
+          </a:scene3d>
+        </p:spPr>
+        <p:txBody>
+          <a:bodyPr wrap="square" rtlCol="0">
+            <a:spAutoFit/>
+          </a:bodyPr>
+          <a:lstStyle/>
+          <a:p>
+            <a:r>
+              <a:rPr lang="en-US" sz="8000" b="1" dirty="0">
+                <a:solidFill>
+                  <a:schemeClr val="bg1"/>
+                </a:solidFill>
+                <a:latin typeface="ADLaM Display" panose="02010000000000000000" pitchFamily="2" charset="0"/>
+                <a:ea typeface="ADLaM Display" panose="02010000000000000000" pitchFamily="2" charset="0"/>
+                <a:cs typeface="ADLaM Display" panose="02010000000000000000" pitchFamily="2" charset="0"/>
+              </a:rPr>
+              <a:t>5</a:t>
+            </a:r>
+          </a:p>
+        </p:txBody>
+      </p:sp>
+      <p:sp>
+        <p:nvSpPr>
+          <p:cNvPr id="32" name="Rectangle: Rounded Corners 31">
+            <a:extLst>
+              <a:ext uri="{FF2B5EF4-FFF2-40B4-BE49-F238E27FC236}">
+                <a16:creationId xmlns:a16="http://schemas.microsoft.com/office/drawing/2014/main" id="{C27C5009-B66F-B976-2F43-4D283C9D70C0}"/>
+              </a:ext>
+            </a:extLst>
+          </p:cNvPr>
+          <p:cNvSpPr/>
+          <p:nvPr/>
+        </p:nvSpPr>
+        <p:spPr>
+          <a:xfrm>
+            <a:off x="6252484" y="4583386"/>
+            <a:ext cx="2062115" cy="417156"/>
+          </a:xfrm>
+          <a:prstGeom prst="roundRect">
+            <a:avLst/>
+          </a:prstGeom>
+          <a:solidFill>
+            <a:schemeClr val="bg1"/>
+          </a:solidFill>
+        </p:spPr>
+        <p:style>
+          <a:lnRef idx="2">
+            <a:schemeClr val="accent1">
+              <a:shade val="15000"/>
+            </a:schemeClr>
+          </a:lnRef>
+          <a:fillRef idx="1">
+            <a:schemeClr val="accent1"/>
+          </a:fillRef>
+          <a:effectRef idx="0">
+            <a:schemeClr val="accent1"/>
+          </a:effectRef>
+          <a:fontRef idx="minor">
+            <a:schemeClr val="lt1"/>
+          </a:fontRef>
+        </p:style>
+        <p:txBody>
+          <a:bodyPr rtlCol="0" anchor="ctr"/>
+          <a:lstStyle/>
+          <a:p>
+            <a:pPr algn="ctr"/>
+            <a:r>
+              <a:rPr lang="en-US" sz="2000" dirty="0">
+                <a:solidFill>
+                  <a:schemeClr val="tx1"/>
+                </a:solidFill>
+                <a:latin typeface="Algerian" panose="04020705040A02060702" pitchFamily="82" charset="0"/>
+              </a:rPr>
+              <a:t>CONTINUE</a:t>
+            </a:r>
+          </a:p>
+        </p:txBody>
+      </p:sp>
+      <p:sp>
+        <p:nvSpPr>
+          <p:cNvPr id="33" name="Rectangle: Rounded Corners 32">
+            <a:extLst>
+              <a:ext uri="{FF2B5EF4-FFF2-40B4-BE49-F238E27FC236}">
+                <a16:creationId xmlns:a16="http://schemas.microsoft.com/office/drawing/2014/main" id="{42C97CBD-C3AF-1EF8-6FEB-B2B008C6DB96}"/>
+              </a:ext>
+            </a:extLst>
+          </p:cNvPr>
+          <p:cNvSpPr/>
+          <p:nvPr/>
+        </p:nvSpPr>
+        <p:spPr>
+          <a:xfrm>
+            <a:off x="6261164" y="5210384"/>
+            <a:ext cx="2062115" cy="417156"/>
+          </a:xfrm>
+          <a:prstGeom prst="roundRect">
+            <a:avLst/>
+          </a:prstGeom>
+          <a:solidFill>
+            <a:schemeClr val="bg1"/>
+          </a:solidFill>
+        </p:spPr>
+        <p:style>
+          <a:lnRef idx="2">
+            <a:schemeClr val="accent1">
+              <a:shade val="15000"/>
+            </a:schemeClr>
+          </a:lnRef>
+          <a:fillRef idx="1">
+            <a:schemeClr val="accent1"/>
+          </a:fillRef>
+          <a:effectRef idx="0">
+            <a:schemeClr val="accent1"/>
+          </a:effectRef>
+          <a:fontRef idx="minor">
+            <a:schemeClr val="lt1"/>
+          </a:fontRef>
+        </p:style>
+        <p:txBody>
+          <a:bodyPr rtlCol="0" anchor="ctr"/>
+          <a:lstStyle/>
+          <a:p>
+            <a:pPr algn="ctr"/>
+            <a:r>
+              <a:rPr lang="en-US" sz="2000" dirty="0">
+                <a:solidFill>
+                  <a:schemeClr val="tx1"/>
+                </a:solidFill>
+                <a:latin typeface="Algerian" panose="04020705040A02060702" pitchFamily="82" charset="0"/>
+              </a:rPr>
+              <a:t>NEW</a:t>
+            </a:r>
+          </a:p>
+        </p:txBody>
+      </p:sp>
+      <p:sp>
+        <p:nvSpPr>
+          <p:cNvPr id="34" name="Rectangle: Rounded Corners 33">
+            <a:extLst>
+              <a:ext uri="{FF2B5EF4-FFF2-40B4-BE49-F238E27FC236}">
+                <a16:creationId xmlns:a16="http://schemas.microsoft.com/office/drawing/2014/main" id="{AC751847-56FC-5EC1-5F38-6D21AC74A3AA}"/>
+              </a:ext>
+            </a:extLst>
+          </p:cNvPr>
+          <p:cNvSpPr/>
+          <p:nvPr/>
+        </p:nvSpPr>
+        <p:spPr>
+          <a:xfrm>
+            <a:off x="6252484" y="5798956"/>
+            <a:ext cx="2062115" cy="417156"/>
+          </a:xfrm>
+          <a:prstGeom prst="roundRect">
+            <a:avLst/>
+          </a:prstGeom>
+          <a:solidFill>
+            <a:schemeClr val="bg1"/>
+          </a:solidFill>
+        </p:spPr>
+        <p:style>
+          <a:lnRef idx="2">
+            <a:schemeClr val="accent1">
+              <a:shade val="15000"/>
+            </a:schemeClr>
+          </a:lnRef>
+          <a:fillRef idx="1">
+            <a:schemeClr val="accent1"/>
+          </a:fillRef>
+          <a:effectRef idx="0">
+            <a:schemeClr val="accent1"/>
+          </a:effectRef>
+          <a:fontRef idx="minor">
+            <a:schemeClr val="lt1"/>
+          </a:fontRef>
+        </p:style>
+        <p:txBody>
+          <a:bodyPr rtlCol="0" anchor="ctr"/>
+          <a:lstStyle/>
+          <a:p>
+            <a:pPr algn="ctr"/>
+            <a:r>
+              <a:rPr lang="en-US" sz="2000" dirty="0">
+                <a:solidFill>
+                  <a:schemeClr val="tx1"/>
+                </a:solidFill>
+                <a:latin typeface="Algerian" panose="04020705040A02060702" pitchFamily="82" charset="0"/>
+              </a:rPr>
+              <a:t>About</a:t>
+            </a:r>
+          </a:p>
+        </p:txBody>
+      </p:sp>
+    </p:spTree>
+    <p:extLst>
+      <p:ext uri="{BB962C8B-B14F-4D97-AF65-F5344CB8AC3E}">
+        <p14:creationId xmlns:p14="http://schemas.microsoft.com/office/powerpoint/2010/main" val="539012914"/>
+      </p:ext>
+    </p:extLst>
+  </p:cSld>
+  <p:clrMapOvr>
+    <a:masterClrMapping/>
+  </p:clrMapOvr>
+</p:sld>
+</file>
+
+<file path=ppt/slides/slide6.xml><?xml version="1.0" encoding="utf-8"?>
+<p:sld xmlns:a="http://schemas.openxmlformats.org/drawingml/2006/main" xmlns:r="http://schemas.openxmlformats.org/officeDocument/2006/relationships" xmlns:p="http://schemas.openxmlformats.org/presentationml/2006/main">
+  <p:cSld>
+    <p:spTree>
+      <p:nvGrpSpPr>
+        <p:cNvPr id="1" name="">
+          <a:extLst>
+            <a:ext uri="{FF2B5EF4-FFF2-40B4-BE49-F238E27FC236}">
+              <a16:creationId xmlns:a16="http://schemas.microsoft.com/office/drawing/2014/main" id="{CE184CDD-D54E-6390-D5B5-491A83383336}"/>
+            </a:ext>
+          </a:extLst>
+        </p:cNvPr>
+        <p:cNvGrpSpPr/>
+        <p:nvPr/>
+      </p:nvGrpSpPr>
+      <p:grpSpPr>
+        <a:xfrm>
+          <a:off x="0" y="0"/>
+          <a:ext cx="0" cy="0"/>
+          <a:chOff x="0" y="0"/>
+          <a:chExt cx="0" cy="0"/>
+        </a:xfrm>
+      </p:grpSpPr>
+      <p:sp>
+        <p:nvSpPr>
+          <p:cNvPr id="11" name="Rectangle 10">
+            <a:extLst>
+              <a:ext uri="{FF2B5EF4-FFF2-40B4-BE49-F238E27FC236}">
+                <a16:creationId xmlns:a16="http://schemas.microsoft.com/office/drawing/2014/main" id="{BB83B6A2-373A-C17B-255C-057BCFAF1F82}"/>
+              </a:ext>
+            </a:extLst>
+          </p:cNvPr>
+          <p:cNvSpPr/>
+          <p:nvPr/>
+        </p:nvSpPr>
+        <p:spPr>
+          <a:xfrm>
+            <a:off x="5538744" y="30478"/>
+            <a:ext cx="3327464" cy="6845378"/>
+          </a:xfrm>
+          <a:prstGeom prst="rect">
+            <a:avLst/>
+          </a:prstGeom>
+          <a:gradFill flip="none" rotWithShape="1">
+            <a:gsLst>
+              <a:gs pos="100000">
+                <a:srgbClr val="FFB5C1"/>
+              </a:gs>
+              <a:gs pos="0">
+                <a:srgbClr val="FCE3E9"/>
+              </a:gs>
+              <a:gs pos="100000">
+                <a:srgbClr val="FF617B"/>
+              </a:gs>
+            </a:gsLst>
+            <a:lin ang="2700000" scaled="1"/>
+            <a:tileRect/>
+          </a:gradFill>
+          <a:ln>
+            <a:solidFill>
+              <a:schemeClr val="accent1">
+                <a:shade val="15000"/>
+              </a:schemeClr>
+            </a:solidFill>
+          </a:ln>
+        </p:spPr>
+        <p:style>
+          <a:lnRef idx="2">
+            <a:schemeClr val="accent1">
+              <a:shade val="15000"/>
+            </a:schemeClr>
+          </a:lnRef>
+          <a:fillRef idx="1">
+            <a:schemeClr val="accent1"/>
+          </a:fillRef>
+          <a:effectRef idx="0">
+            <a:schemeClr val="accent1"/>
+          </a:effectRef>
+          <a:fontRef idx="minor">
+            <a:schemeClr val="lt1"/>
+          </a:fontRef>
+        </p:style>
+        <p:txBody>
+          <a:bodyPr rtlCol="0" anchor="ctr"/>
+          <a:lstStyle/>
+          <a:p>
+            <a:pPr algn="ctr"/>
+            <a:endParaRPr lang="en-US" dirty="0"/>
+          </a:p>
+        </p:txBody>
+      </p:sp>
+      <p:sp>
+        <p:nvSpPr>
+          <p:cNvPr id="12" name="Oval 11">
+            <a:extLst>
+              <a:ext uri="{FF2B5EF4-FFF2-40B4-BE49-F238E27FC236}">
+                <a16:creationId xmlns:a16="http://schemas.microsoft.com/office/drawing/2014/main" id="{1A3E384C-59C2-67C1-61EB-4EEBDE3F9AE0}"/>
+              </a:ext>
+            </a:extLst>
+          </p:cNvPr>
+          <p:cNvSpPr/>
+          <p:nvPr/>
+        </p:nvSpPr>
+        <p:spPr>
+          <a:xfrm>
+            <a:off x="4485310" y="702586"/>
+            <a:ext cx="2985670" cy="2229684"/>
+          </a:xfrm>
+          <a:prstGeom prst="ellipse">
+            <a:avLst/>
+          </a:prstGeom>
+          <a:solidFill>
+            <a:srgbClr val="FCE3E9"/>
+          </a:solidFill>
+          <a:ln>
+            <a:noFill/>
+          </a:ln>
+        </p:spPr>
+        <p:style>
+          <a:lnRef idx="2">
+            <a:schemeClr val="accent1">
+              <a:shade val="15000"/>
+            </a:schemeClr>
+          </a:lnRef>
+          <a:fillRef idx="1">
+            <a:schemeClr val="accent1"/>
+          </a:fillRef>
+          <a:effectRef idx="0">
+            <a:schemeClr val="accent1"/>
+          </a:effectRef>
+          <a:fontRef idx="minor">
+            <a:schemeClr val="lt1"/>
+          </a:fontRef>
+        </p:style>
+        <p:txBody>
+          <a:bodyPr rtlCol="0" anchor="ctr"/>
+          <a:lstStyle/>
+          <a:p>
+            <a:pPr algn="ctr"/>
+            <a:endParaRPr lang="en-US" dirty="0"/>
+          </a:p>
+        </p:txBody>
+      </p:sp>
+      <p:sp>
+        <p:nvSpPr>
+          <p:cNvPr id="13" name="Oval 12">
+            <a:extLst>
+              <a:ext uri="{FF2B5EF4-FFF2-40B4-BE49-F238E27FC236}">
+                <a16:creationId xmlns:a16="http://schemas.microsoft.com/office/drawing/2014/main" id="{B5D744C4-7A30-199A-3A6E-92E9F5F96F5B}"/>
+              </a:ext>
+            </a:extLst>
+          </p:cNvPr>
+          <p:cNvSpPr/>
+          <p:nvPr/>
+        </p:nvSpPr>
+        <p:spPr>
+          <a:xfrm>
+            <a:off x="6376483" y="1252664"/>
+            <a:ext cx="4783184" cy="4544285"/>
+          </a:xfrm>
+          <a:prstGeom prst="ellipse">
+            <a:avLst/>
+          </a:prstGeom>
+          <a:solidFill>
+            <a:srgbClr val="FCE3E9"/>
+          </a:solidFill>
+          <a:ln>
+            <a:noFill/>
+          </a:ln>
+        </p:spPr>
+        <p:style>
+          <a:lnRef idx="2">
+            <a:schemeClr val="accent1">
+              <a:shade val="15000"/>
+            </a:schemeClr>
+          </a:lnRef>
+          <a:fillRef idx="1">
+            <a:schemeClr val="accent1"/>
+          </a:fillRef>
+          <a:effectRef idx="0">
+            <a:schemeClr val="accent1"/>
+          </a:effectRef>
+          <a:fontRef idx="minor">
+            <a:schemeClr val="lt1"/>
+          </a:fontRef>
+        </p:style>
+        <p:txBody>
+          <a:bodyPr rtlCol="0" anchor="ctr"/>
+          <a:lstStyle/>
+          <a:p>
+            <a:pPr algn="ctr"/>
+            <a:endParaRPr lang="en-US" dirty="0"/>
+          </a:p>
+        </p:txBody>
+      </p:sp>
+      <p:sp>
+        <p:nvSpPr>
+          <p:cNvPr id="14" name="Oval 13">
+            <a:extLst>
+              <a:ext uri="{FF2B5EF4-FFF2-40B4-BE49-F238E27FC236}">
+                <a16:creationId xmlns:a16="http://schemas.microsoft.com/office/drawing/2014/main" id="{7F5A1D53-372B-FD33-9B8C-BA7107776092}"/>
+              </a:ext>
+            </a:extLst>
+          </p:cNvPr>
+          <p:cNvSpPr/>
+          <p:nvPr/>
+        </p:nvSpPr>
+        <p:spPr>
+          <a:xfrm>
+            <a:off x="4526696" y="4479152"/>
+            <a:ext cx="4818960" cy="4022035"/>
+          </a:xfrm>
+          <a:prstGeom prst="ellipse">
+            <a:avLst/>
+          </a:prstGeom>
+          <a:solidFill>
+            <a:srgbClr val="FFD5DE"/>
+          </a:solidFill>
+          <a:ln>
+            <a:noFill/>
+          </a:ln>
+        </p:spPr>
+        <p:style>
+          <a:lnRef idx="2">
+            <a:schemeClr val="accent1">
+              <a:shade val="15000"/>
+            </a:schemeClr>
+          </a:lnRef>
+          <a:fillRef idx="1">
+            <a:schemeClr val="accent1"/>
+          </a:fillRef>
+          <a:effectRef idx="0">
+            <a:schemeClr val="accent1"/>
+          </a:effectRef>
+          <a:fontRef idx="minor">
+            <a:schemeClr val="lt1"/>
+          </a:fontRef>
+        </p:style>
+        <p:txBody>
+          <a:bodyPr rtlCol="0" anchor="ctr"/>
+          <a:lstStyle/>
+          <a:p>
+            <a:pPr algn="ctr"/>
+            <a:endParaRPr lang="en-US" dirty="0"/>
+          </a:p>
+        </p:txBody>
+      </p:sp>
+      <p:sp>
+        <p:nvSpPr>
+          <p:cNvPr id="2" name="Rectangle 1">
+            <a:extLst>
+              <a:ext uri="{FF2B5EF4-FFF2-40B4-BE49-F238E27FC236}">
+                <a16:creationId xmlns:a16="http://schemas.microsoft.com/office/drawing/2014/main" id="{5BDFCA34-DD7E-5DC8-11E1-A90BE3B64C45}"/>
+              </a:ext>
+            </a:extLst>
+          </p:cNvPr>
+          <p:cNvSpPr/>
+          <p:nvPr/>
+        </p:nvSpPr>
+        <p:spPr>
+          <a:xfrm>
+            <a:off x="2846344" y="30480"/>
+            <a:ext cx="2692400" cy="6974093"/>
+          </a:xfrm>
+          <a:prstGeom prst="rect">
+            <a:avLst/>
+          </a:prstGeom>
+          <a:solidFill>
+            <a:schemeClr val="bg1"/>
+          </a:solidFill>
+        </p:spPr>
+        <p:style>
+          <a:lnRef idx="2">
+            <a:schemeClr val="accent1">
+              <a:shade val="15000"/>
+            </a:schemeClr>
+          </a:lnRef>
+          <a:fillRef idx="1">
+            <a:schemeClr val="accent1"/>
+          </a:fillRef>
+          <a:effectRef idx="0">
+            <a:schemeClr val="accent1"/>
+          </a:effectRef>
+          <a:fontRef idx="minor">
+            <a:schemeClr val="lt1"/>
+          </a:fontRef>
+        </p:style>
+        <p:txBody>
+          <a:bodyPr rtlCol="0" anchor="ctr"/>
+          <a:lstStyle/>
+          <a:p>
+            <a:pPr algn="ctr"/>
+            <a:endParaRPr lang="en-US"/>
+          </a:p>
+        </p:txBody>
+      </p:sp>
+      <p:sp>
+        <p:nvSpPr>
+          <p:cNvPr id="3" name="Rectangle 2">
+            <a:extLst>
+              <a:ext uri="{FF2B5EF4-FFF2-40B4-BE49-F238E27FC236}">
+                <a16:creationId xmlns:a16="http://schemas.microsoft.com/office/drawing/2014/main" id="{0B5DAE26-6071-0096-B421-B4831A788638}"/>
+              </a:ext>
+            </a:extLst>
+          </p:cNvPr>
+          <p:cNvSpPr/>
+          <p:nvPr/>
+        </p:nvSpPr>
+        <p:spPr>
+          <a:xfrm>
+            <a:off x="3567146" y="6875855"/>
+            <a:ext cx="6172224" cy="2436957"/>
+          </a:xfrm>
+          <a:prstGeom prst="rect">
+            <a:avLst/>
+          </a:prstGeom>
+          <a:solidFill>
+            <a:schemeClr val="bg1"/>
+          </a:solidFill>
+        </p:spPr>
+        <p:style>
+          <a:lnRef idx="2">
+            <a:schemeClr val="accent1">
+              <a:shade val="15000"/>
+            </a:schemeClr>
+          </a:lnRef>
+          <a:fillRef idx="1">
+            <a:schemeClr val="accent1"/>
+          </a:fillRef>
+          <a:effectRef idx="0">
+            <a:schemeClr val="accent1"/>
+          </a:effectRef>
+          <a:fontRef idx="minor">
+            <a:schemeClr val="lt1"/>
+          </a:fontRef>
+        </p:style>
+        <p:txBody>
+          <a:bodyPr rtlCol="0" anchor="ctr"/>
+          <a:lstStyle/>
+          <a:p>
+            <a:pPr algn="ctr"/>
+            <a:endParaRPr lang="en-US"/>
+          </a:p>
+        </p:txBody>
+      </p:sp>
+      <p:sp>
+        <p:nvSpPr>
+          <p:cNvPr id="5" name="Rectangle 4">
+            <a:extLst>
+              <a:ext uri="{FF2B5EF4-FFF2-40B4-BE49-F238E27FC236}">
+                <a16:creationId xmlns:a16="http://schemas.microsoft.com/office/drawing/2014/main" id="{F73CDDAB-0BB9-AF9C-C88A-15809BDAAF93}"/>
+              </a:ext>
+            </a:extLst>
+          </p:cNvPr>
+          <p:cNvSpPr/>
+          <p:nvPr/>
+        </p:nvSpPr>
+        <p:spPr>
+          <a:xfrm>
+            <a:off x="8866207" y="30478"/>
+            <a:ext cx="3880631" cy="6845376"/>
+          </a:xfrm>
+          <a:prstGeom prst="rect">
+            <a:avLst/>
+          </a:prstGeom>
+          <a:solidFill>
+            <a:schemeClr val="bg1"/>
+          </a:solidFill>
+        </p:spPr>
+        <p:style>
+          <a:lnRef idx="2">
+            <a:schemeClr val="accent1">
+              <a:shade val="15000"/>
+            </a:schemeClr>
+          </a:lnRef>
+          <a:fillRef idx="1">
+            <a:schemeClr val="accent1"/>
+          </a:fillRef>
+          <a:effectRef idx="0">
+            <a:schemeClr val="accent1"/>
+          </a:effectRef>
+          <a:fontRef idx="minor">
+            <a:schemeClr val="lt1"/>
+          </a:fontRef>
+        </p:style>
+        <p:txBody>
+          <a:bodyPr rtlCol="0" anchor="ctr"/>
+          <a:lstStyle/>
+          <a:p>
+            <a:pPr algn="ctr"/>
+            <a:endParaRPr lang="en-US"/>
+          </a:p>
+        </p:txBody>
+      </p:sp>
+      <p:sp>
+        <p:nvSpPr>
+          <p:cNvPr id="18" name="Freeform: Shape 17">
+            <a:extLst>
+              <a:ext uri="{FF2B5EF4-FFF2-40B4-BE49-F238E27FC236}">
+                <a16:creationId xmlns:a16="http://schemas.microsoft.com/office/drawing/2014/main" id="{1EA58903-C114-FFF8-0E03-8C276338CB58}"/>
+              </a:ext>
+            </a:extLst>
+          </p:cNvPr>
+          <p:cNvSpPr/>
+          <p:nvPr/>
+        </p:nvSpPr>
+        <p:spPr>
+          <a:xfrm>
+            <a:off x="5914536" y="722633"/>
+            <a:ext cx="2748954" cy="2211876"/>
+          </a:xfrm>
+          <a:custGeom>
+            <a:avLst/>
+            <a:gdLst>
+              <a:gd name="connsiteX0" fmla="*/ 262210 w 2748954"/>
+              <a:gd name="connsiteY0" fmla="*/ 223456 h 2211876"/>
+              <a:gd name="connsiteX1" fmla="*/ 262210 w 2748954"/>
+              <a:gd name="connsiteY1" fmla="*/ 1909381 h 2211876"/>
+              <a:gd name="connsiteX2" fmla="*/ 2662510 w 2748954"/>
+              <a:gd name="connsiteY2" fmla="*/ 2052256 h 2211876"/>
+              <a:gd name="connsiteX3" fmla="*/ 2033860 w 2748954"/>
+              <a:gd name="connsiteY3" fmla="*/ 213931 h 2211876"/>
+              <a:gd name="connsiteX4" fmla="*/ 262210 w 2748954"/>
+              <a:gd name="connsiteY4" fmla="*/ 223456 h 2211876"/>
+            </a:gdLst>
+            <a:ahLst/>
+            <a:cxnLst>
+              <a:cxn ang="0">
+                <a:pos x="connsiteX0" y="connsiteY0"/>
+              </a:cxn>
+              <a:cxn ang="0">
+                <a:pos x="connsiteX1" y="connsiteY1"/>
+              </a:cxn>
+              <a:cxn ang="0">
+                <a:pos x="connsiteX2" y="connsiteY2"/>
+              </a:cxn>
+              <a:cxn ang="0">
+                <a:pos x="connsiteX3" y="connsiteY3"/>
+              </a:cxn>
+              <a:cxn ang="0">
+                <a:pos x="connsiteX4" y="connsiteY4"/>
+              </a:cxn>
+            </a:cxnLst>
+            <a:rect l="l" t="t" r="r" b="b"/>
+            <a:pathLst>
+              <a:path w="2748954" h="2211876">
+                <a:moveTo>
+                  <a:pt x="262210" y="223456"/>
+                </a:moveTo>
+                <a:cubicBezTo>
+                  <a:pt x="-33065" y="506031"/>
+                  <a:pt x="-137840" y="1604581"/>
+                  <a:pt x="262210" y="1909381"/>
+                </a:cubicBezTo>
+                <a:cubicBezTo>
+                  <a:pt x="662260" y="2214181"/>
+                  <a:pt x="2367235" y="2334831"/>
+                  <a:pt x="2662510" y="2052256"/>
+                </a:cubicBezTo>
+                <a:cubicBezTo>
+                  <a:pt x="2957785" y="1769681"/>
+                  <a:pt x="2433910" y="513968"/>
+                  <a:pt x="2033860" y="213931"/>
+                </a:cubicBezTo>
+                <a:cubicBezTo>
+                  <a:pt x="1633810" y="-86106"/>
+                  <a:pt x="557485" y="-59119"/>
+                  <a:pt x="262210" y="223456"/>
+                </a:cubicBezTo>
+                <a:close/>
+              </a:path>
+            </a:pathLst>
+          </a:custGeom>
+          <a:solidFill>
+            <a:schemeClr val="bg1"/>
+          </a:solidFill>
+        </p:spPr>
+        <p:style>
+          <a:lnRef idx="2">
+            <a:schemeClr val="accent1">
+              <a:shade val="15000"/>
+            </a:schemeClr>
+          </a:lnRef>
+          <a:fillRef idx="1">
+            <a:schemeClr val="accent1"/>
+          </a:fillRef>
+          <a:effectRef idx="0">
+            <a:schemeClr val="accent1"/>
+          </a:effectRef>
+          <a:fontRef idx="minor">
+            <a:schemeClr val="lt1"/>
+          </a:fontRef>
+        </p:style>
+        <p:txBody>
+          <a:bodyPr rtlCol="0" anchor="ctr"/>
+          <a:lstStyle/>
+          <a:p>
+            <a:pPr algn="ctr"/>
+            <a:endParaRPr lang="en-US"/>
+          </a:p>
+        </p:txBody>
+      </p:sp>
+      <p:sp>
+        <p:nvSpPr>
+          <p:cNvPr id="26" name="TextBox 25">
+            <a:extLst>
+              <a:ext uri="{FF2B5EF4-FFF2-40B4-BE49-F238E27FC236}">
+                <a16:creationId xmlns:a16="http://schemas.microsoft.com/office/drawing/2014/main" id="{E6889C8E-C231-1747-C9C9-6E76977F1AE3}"/>
+              </a:ext>
+            </a:extLst>
+          </p:cNvPr>
+          <p:cNvSpPr txBox="1"/>
+          <p:nvPr/>
+        </p:nvSpPr>
+        <p:spPr>
+          <a:xfrm>
+            <a:off x="5625049" y="2091861"/>
+            <a:ext cx="1211434" cy="830997"/>
+          </a:xfrm>
+          <a:prstGeom prst="rect">
+            <a:avLst/>
+          </a:prstGeom>
+          <a:noFill/>
+          <a:effectLst>
+            <a:outerShdw blurRad="190500" dist="38100" algn="l" rotWithShape="0">
+              <a:prstClr val="black">
+                <a:alpha val="28000"/>
+              </a:prstClr>
+            </a:outerShdw>
+            <a:softEdge rad="127000"/>
+          </a:effectLst>
+          <a:scene3d>
+            <a:camera prst="isometricRightUp">
+              <a:rot lat="1200000" lon="21594000" rev="2400000"/>
+            </a:camera>
+            <a:lightRig rig="threePt" dir="t"/>
+          </a:scene3d>
+        </p:spPr>
+        <p:txBody>
+          <a:bodyPr wrap="square" rtlCol="0">
+            <a:spAutoFit/>
+          </a:bodyPr>
+          <a:lstStyle/>
+          <a:p>
+            <a:r>
+              <a:rPr lang="en-US" sz="4800" b="1" dirty="0">
+                <a:solidFill>
+                  <a:schemeClr val="bg1"/>
+                </a:solidFill>
+                <a:latin typeface="ADLaM Display" panose="02010000000000000000" pitchFamily="2" charset="0"/>
+                <a:ea typeface="ADLaM Display" panose="02010000000000000000" pitchFamily="2" charset="0"/>
+                <a:cs typeface="ADLaM Display" panose="02010000000000000000" pitchFamily="2" charset="0"/>
+              </a:rPr>
+              <a:t>2</a:t>
+            </a:r>
+          </a:p>
+        </p:txBody>
+      </p:sp>
+      <p:sp>
+        <p:nvSpPr>
+          <p:cNvPr id="23" name="TextBox 22">
+            <a:extLst>
+              <a:ext uri="{FF2B5EF4-FFF2-40B4-BE49-F238E27FC236}">
+                <a16:creationId xmlns:a16="http://schemas.microsoft.com/office/drawing/2014/main" id="{446660B4-7F15-C4B8-954F-04E0E5B40EC1}"/>
+              </a:ext>
+            </a:extLst>
+          </p:cNvPr>
+          <p:cNvSpPr txBox="1"/>
+          <p:nvPr/>
+        </p:nvSpPr>
+        <p:spPr>
+          <a:xfrm>
+            <a:off x="5492782" y="5746559"/>
+            <a:ext cx="1211434" cy="830997"/>
+          </a:xfrm>
+          <a:prstGeom prst="rect">
+            <a:avLst/>
+          </a:prstGeom>
+          <a:noFill/>
+          <a:effectLst>
+            <a:outerShdw blurRad="190500" dist="38100" algn="l" rotWithShape="0">
+              <a:prstClr val="black">
+                <a:alpha val="28000"/>
+              </a:prstClr>
+            </a:outerShdw>
+            <a:softEdge rad="127000"/>
+          </a:effectLst>
+          <a:scene3d>
+            <a:camera prst="isometricRightUp">
+              <a:rot lat="1800000" lon="20400000" rev="600000"/>
+            </a:camera>
+            <a:lightRig rig="threePt" dir="t"/>
+          </a:scene3d>
+        </p:spPr>
+        <p:txBody>
+          <a:bodyPr wrap="square" rtlCol="0">
+            <a:spAutoFit/>
+          </a:bodyPr>
+          <a:lstStyle/>
+          <a:p>
+            <a:r>
+              <a:rPr lang="en-US" sz="4800" b="1" dirty="0">
+                <a:solidFill>
+                  <a:schemeClr val="bg1"/>
+                </a:solidFill>
+                <a:latin typeface="ADLaM Display" panose="02010000000000000000" pitchFamily="2" charset="0"/>
+                <a:ea typeface="ADLaM Display" panose="02010000000000000000" pitchFamily="2" charset="0"/>
+                <a:cs typeface="ADLaM Display" panose="02010000000000000000" pitchFamily="2" charset="0"/>
+              </a:rPr>
+              <a:t>7</a:t>
+            </a:r>
+          </a:p>
+        </p:txBody>
+      </p:sp>
+      <p:sp>
+        <p:nvSpPr>
+          <p:cNvPr id="24" name="TextBox 23">
+            <a:extLst>
+              <a:ext uri="{FF2B5EF4-FFF2-40B4-BE49-F238E27FC236}">
+                <a16:creationId xmlns:a16="http://schemas.microsoft.com/office/drawing/2014/main" id="{3657A5C4-3569-BA37-A2DD-0F00D3BF312B}"/>
+              </a:ext>
+            </a:extLst>
+          </p:cNvPr>
+          <p:cNvSpPr txBox="1"/>
+          <p:nvPr/>
+        </p:nvSpPr>
+        <p:spPr>
+          <a:xfrm>
+            <a:off x="7822357" y="2540590"/>
+            <a:ext cx="1211434" cy="1323439"/>
+          </a:xfrm>
+          <a:prstGeom prst="rect">
+            <a:avLst/>
+          </a:prstGeom>
+          <a:noFill/>
+          <a:effectLst>
+            <a:outerShdw blurRad="190500" dist="38100" algn="l" rotWithShape="0">
+              <a:prstClr val="black">
+                <a:alpha val="28000"/>
+              </a:prstClr>
+            </a:outerShdw>
+            <a:softEdge rad="127000"/>
+          </a:effectLst>
+          <a:scene3d>
+            <a:camera prst="isometricRightUp">
+              <a:rot lat="9000000" lon="12000000" rev="9000000"/>
+            </a:camera>
+            <a:lightRig rig="threePt" dir="t"/>
+          </a:scene3d>
+        </p:spPr>
+        <p:txBody>
+          <a:bodyPr wrap="square" rtlCol="0">
+            <a:spAutoFit/>
+          </a:bodyPr>
+          <a:lstStyle/>
+          <a:p>
+            <a:r>
+              <a:rPr lang="en-US" sz="8000" b="1" dirty="0">
+                <a:solidFill>
+                  <a:schemeClr val="bg1"/>
+                </a:solidFill>
+                <a:latin typeface="ADLaM Display" panose="02010000000000000000" pitchFamily="2" charset="0"/>
+                <a:ea typeface="ADLaM Display" panose="02010000000000000000" pitchFamily="2" charset="0"/>
+                <a:cs typeface="ADLaM Display" panose="02010000000000000000" pitchFamily="2" charset="0"/>
+              </a:rPr>
+              <a:t>9</a:t>
+            </a:r>
+          </a:p>
+        </p:txBody>
+      </p:sp>
+      <p:sp>
+        <p:nvSpPr>
+          <p:cNvPr id="25" name="TextBox 24">
+            <a:extLst>
+              <a:ext uri="{FF2B5EF4-FFF2-40B4-BE49-F238E27FC236}">
+                <a16:creationId xmlns:a16="http://schemas.microsoft.com/office/drawing/2014/main" id="{6092F64D-7E91-1150-ABB7-6AEE1AC95161}"/>
+              </a:ext>
+            </a:extLst>
+          </p:cNvPr>
+          <p:cNvSpPr txBox="1"/>
+          <p:nvPr/>
+        </p:nvSpPr>
+        <p:spPr>
+          <a:xfrm>
+            <a:off x="7848335" y="4887614"/>
+            <a:ext cx="1211434" cy="830997"/>
+          </a:xfrm>
+          <a:prstGeom prst="rect">
+            <a:avLst/>
+          </a:prstGeom>
+          <a:noFill/>
+          <a:effectLst>
+            <a:outerShdw blurRad="190500" dist="38100" algn="l" rotWithShape="0">
+              <a:prstClr val="black">
+                <a:alpha val="28000"/>
+              </a:prstClr>
+            </a:outerShdw>
+            <a:softEdge rad="127000"/>
+          </a:effectLst>
+          <a:scene3d>
+            <a:camera prst="isometricRightUp">
+              <a:rot lat="9000000" lon="12000000" rev="1800000"/>
+            </a:camera>
+            <a:lightRig rig="threePt" dir="t"/>
+          </a:scene3d>
+        </p:spPr>
+        <p:txBody>
+          <a:bodyPr wrap="square" rtlCol="0">
+            <a:spAutoFit/>
+          </a:bodyPr>
+          <a:lstStyle/>
+          <a:p>
+            <a:r>
+              <a:rPr lang="en-US" sz="4800" b="1" dirty="0">
+                <a:solidFill>
+                  <a:schemeClr val="bg1"/>
+                </a:solidFill>
+                <a:latin typeface="ADLaM Display" panose="02010000000000000000" pitchFamily="2" charset="0"/>
+                <a:ea typeface="ADLaM Display" panose="02010000000000000000" pitchFamily="2" charset="0"/>
+                <a:cs typeface="ADLaM Display" panose="02010000000000000000" pitchFamily="2" charset="0"/>
+              </a:rPr>
+              <a:t>8</a:t>
+            </a:r>
+          </a:p>
+        </p:txBody>
+      </p:sp>
+      <p:sp>
+        <p:nvSpPr>
+          <p:cNvPr id="27" name="TextBox 26">
+            <a:extLst>
+              <a:ext uri="{FF2B5EF4-FFF2-40B4-BE49-F238E27FC236}">
+                <a16:creationId xmlns:a16="http://schemas.microsoft.com/office/drawing/2014/main" id="{C77DF76D-3DE5-82C8-B21B-2848BA5FD39B}"/>
+              </a:ext>
+            </a:extLst>
+          </p:cNvPr>
+          <p:cNvSpPr txBox="1"/>
+          <p:nvPr/>
+        </p:nvSpPr>
+        <p:spPr>
+          <a:xfrm>
+            <a:off x="6328539" y="2976594"/>
+            <a:ext cx="1211434" cy="830997"/>
+          </a:xfrm>
+          <a:prstGeom prst="rect">
+            <a:avLst/>
+          </a:prstGeom>
+          <a:noFill/>
+          <a:effectLst>
+            <a:outerShdw blurRad="38100" dist="558800" algn="l" rotWithShape="0">
+              <a:prstClr val="black">
+                <a:alpha val="93000"/>
+              </a:prstClr>
+            </a:outerShdw>
+            <a:softEdge rad="127000"/>
+          </a:effectLst>
+          <a:scene3d>
+            <a:camera prst="isometricRightUp">
+              <a:rot lat="2433751" lon="19169909" rev="1118621"/>
+            </a:camera>
+            <a:lightRig rig="threePt" dir="t"/>
+          </a:scene3d>
+        </p:spPr>
+        <p:txBody>
+          <a:bodyPr wrap="square" rtlCol="0">
+            <a:spAutoFit/>
+          </a:bodyPr>
+          <a:lstStyle/>
+          <a:p>
+            <a:r>
+              <a:rPr lang="en-US" sz="4800" b="1" dirty="0">
+                <a:solidFill>
+                  <a:schemeClr val="bg1"/>
+                </a:solidFill>
+                <a:latin typeface="ADLaM Display" panose="02010000000000000000" pitchFamily="2" charset="0"/>
+                <a:ea typeface="ADLaM Display" panose="02010000000000000000" pitchFamily="2" charset="0"/>
+                <a:cs typeface="ADLaM Display" panose="02010000000000000000" pitchFamily="2" charset="0"/>
+              </a:rPr>
+              <a:t>3</a:t>
+            </a:r>
+          </a:p>
+        </p:txBody>
+      </p:sp>
+      <p:sp>
+        <p:nvSpPr>
+          <p:cNvPr id="28" name="TextBox 27">
+            <a:extLst>
+              <a:ext uri="{FF2B5EF4-FFF2-40B4-BE49-F238E27FC236}">
+                <a16:creationId xmlns:a16="http://schemas.microsoft.com/office/drawing/2014/main" id="{8FEEEA20-9E6E-E1CC-BFAB-042B0897E12D}"/>
+              </a:ext>
+            </a:extLst>
+          </p:cNvPr>
+          <p:cNvSpPr txBox="1"/>
+          <p:nvPr/>
+        </p:nvSpPr>
+        <p:spPr>
+          <a:xfrm>
+            <a:off x="7782333" y="26579"/>
+            <a:ext cx="1211434" cy="400110"/>
+          </a:xfrm>
+          <a:prstGeom prst="rect">
+            <a:avLst/>
+          </a:prstGeom>
+          <a:noFill/>
+          <a:effectLst>
+            <a:outerShdw blurRad="190500" dist="38100" algn="l" rotWithShape="0">
+              <a:prstClr val="black">
+                <a:alpha val="28000"/>
+              </a:prstClr>
+            </a:outerShdw>
+            <a:softEdge rad="127000"/>
+          </a:effectLst>
+          <a:scene3d>
+            <a:camera prst="isometricRightUp">
+              <a:rot lat="0" lon="20400000" rev="0"/>
+            </a:camera>
+            <a:lightRig rig="threePt" dir="t"/>
+          </a:scene3d>
+        </p:spPr>
+        <p:txBody>
+          <a:bodyPr wrap="square" rtlCol="0">
+            <a:spAutoFit/>
+          </a:bodyPr>
+          <a:lstStyle/>
+          <a:p>
+            <a:r>
+              <a:rPr lang="en-US" sz="2000" b="1" dirty="0">
+                <a:solidFill>
+                  <a:schemeClr val="bg1"/>
+                </a:solidFill>
+                <a:latin typeface="ADLaM Display" panose="02010000000000000000" pitchFamily="2" charset="0"/>
+                <a:ea typeface="ADLaM Display" panose="02010000000000000000" pitchFamily="2" charset="0"/>
+                <a:cs typeface="ADLaM Display" panose="02010000000000000000" pitchFamily="2" charset="0"/>
+              </a:rPr>
+              <a:t>1</a:t>
+            </a:r>
+          </a:p>
+        </p:txBody>
+      </p:sp>
+      <p:sp>
+        <p:nvSpPr>
+          <p:cNvPr id="29" name="TextBox 28">
+            <a:extLst>
+              <a:ext uri="{FF2B5EF4-FFF2-40B4-BE49-F238E27FC236}">
+                <a16:creationId xmlns:a16="http://schemas.microsoft.com/office/drawing/2014/main" id="{BC57F222-B0C9-F4B0-1F2B-E356B4071A08}"/>
+              </a:ext>
+            </a:extLst>
+          </p:cNvPr>
+          <p:cNvSpPr txBox="1"/>
+          <p:nvPr/>
+        </p:nvSpPr>
+        <p:spPr>
+          <a:xfrm>
+            <a:off x="5728974" y="-91655"/>
+            <a:ext cx="1211434" cy="830997"/>
+          </a:xfrm>
+          <a:prstGeom prst="rect">
+            <a:avLst/>
+          </a:prstGeom>
+          <a:noFill/>
+          <a:effectLst>
+            <a:outerShdw blurRad="190500" dist="38100" algn="l" rotWithShape="0">
+              <a:prstClr val="black">
+                <a:alpha val="28000"/>
+              </a:prstClr>
+            </a:outerShdw>
+            <a:softEdge rad="127000"/>
+          </a:effectLst>
+          <a:scene3d>
+            <a:camera prst="isometricRightUp">
+              <a:rot lat="1800000" lon="20400000" rev="600000"/>
+            </a:camera>
+            <a:lightRig rig="threePt" dir="t"/>
+          </a:scene3d>
+        </p:spPr>
+        <p:txBody>
+          <a:bodyPr wrap="square" rtlCol="0">
+            <a:spAutoFit/>
+          </a:bodyPr>
+          <a:lstStyle/>
+          <a:p>
+            <a:r>
+              <a:rPr lang="en-US" sz="4800" b="1" dirty="0">
+                <a:solidFill>
+                  <a:schemeClr val="bg1"/>
+                </a:solidFill>
+                <a:latin typeface="ADLaM Display" panose="02010000000000000000" pitchFamily="2" charset="0"/>
+                <a:ea typeface="ADLaM Display" panose="02010000000000000000" pitchFamily="2" charset="0"/>
+                <a:cs typeface="ADLaM Display" panose="02010000000000000000" pitchFamily="2" charset="0"/>
+              </a:rPr>
+              <a:t>4</a:t>
+            </a:r>
+          </a:p>
+        </p:txBody>
+      </p:sp>
+      <p:sp>
+        <p:nvSpPr>
+          <p:cNvPr id="30" name="TextBox 29">
+            <a:extLst>
+              <a:ext uri="{FF2B5EF4-FFF2-40B4-BE49-F238E27FC236}">
+                <a16:creationId xmlns:a16="http://schemas.microsoft.com/office/drawing/2014/main" id="{CC147797-9D87-0D77-4EAC-8541A75B9289}"/>
+              </a:ext>
+            </a:extLst>
+          </p:cNvPr>
+          <p:cNvSpPr txBox="1"/>
+          <p:nvPr/>
+        </p:nvSpPr>
+        <p:spPr>
+          <a:xfrm>
+            <a:off x="8243335" y="330954"/>
+            <a:ext cx="1211434" cy="1323439"/>
+          </a:xfrm>
+          <a:prstGeom prst="rect">
+            <a:avLst/>
+          </a:prstGeom>
+          <a:noFill/>
+          <a:effectLst>
+            <a:outerShdw blurRad="190500" dist="38100" algn="l" rotWithShape="0">
+              <a:prstClr val="black">
+                <a:alpha val="28000"/>
+              </a:prstClr>
+            </a:outerShdw>
+            <a:softEdge rad="127000"/>
+          </a:effectLst>
+          <a:scene3d>
+            <a:camera prst="isometricRightUp">
+              <a:rot lat="9000000" lon="12000000" rev="9000000"/>
+            </a:camera>
+            <a:lightRig rig="threePt" dir="t"/>
+          </a:scene3d>
+        </p:spPr>
+        <p:txBody>
+          <a:bodyPr wrap="square" rtlCol="0">
+            <a:spAutoFit/>
+          </a:bodyPr>
+          <a:lstStyle/>
+          <a:p>
+            <a:r>
+              <a:rPr lang="en-US" sz="8000" b="1" dirty="0">
+                <a:solidFill>
+                  <a:schemeClr val="bg1"/>
+                </a:solidFill>
+                <a:latin typeface="ADLaM Display" panose="02010000000000000000" pitchFamily="2" charset="0"/>
+                <a:ea typeface="ADLaM Display" panose="02010000000000000000" pitchFamily="2" charset="0"/>
+                <a:cs typeface="ADLaM Display" panose="02010000000000000000" pitchFamily="2" charset="0"/>
+              </a:rPr>
+              <a:t>5</a:t>
+            </a:r>
+          </a:p>
+        </p:txBody>
+      </p:sp>
+    </p:spTree>
+    <p:extLst>
+      <p:ext uri="{BB962C8B-B14F-4D97-AF65-F5344CB8AC3E}">
+        <p14:creationId xmlns:p14="http://schemas.microsoft.com/office/powerpoint/2010/main" val="2939406457"/>
+      </p:ext>
+    </p:extLst>
+  </p:cSld>
+  <p:clrMapOvr>
+    <a:masterClrMapping/>
+  </p:clrMapOvr>
+</p:sld>
+</file>
+
+<file path=ppt/slides/slide7.xml><?xml version="1.0" encoding="utf-8"?>
+<p:sld xmlns:a="http://schemas.openxmlformats.org/drawingml/2006/main" xmlns:r="http://schemas.openxmlformats.org/officeDocument/2006/relationships" xmlns:p="http://schemas.openxmlformats.org/presentationml/2006/main">
+  <p:cSld>
+    <p:spTree>
+      <p:nvGrpSpPr>
+        <p:cNvPr id="1" name="">
+          <a:extLst>
+            <a:ext uri="{FF2B5EF4-FFF2-40B4-BE49-F238E27FC236}">
+              <a16:creationId xmlns:a16="http://schemas.microsoft.com/office/drawing/2014/main" id="{D4250CE5-4A2C-F2EC-DFFC-4447BB62004A}"/>
+            </a:ext>
+          </a:extLst>
+        </p:cNvPr>
+        <p:cNvGrpSpPr/>
+        <p:nvPr/>
+      </p:nvGrpSpPr>
+      <p:grpSpPr>
+        <a:xfrm>
+          <a:off x="0" y="0"/>
+          <a:ext cx="0" cy="0"/>
+          <a:chOff x="0" y="0"/>
+          <a:chExt cx="0" cy="0"/>
+        </a:xfrm>
+      </p:grpSpPr>
+      <p:sp>
+        <p:nvSpPr>
+          <p:cNvPr id="11" name="Rectangle 10">
+            <a:extLst>
+              <a:ext uri="{FF2B5EF4-FFF2-40B4-BE49-F238E27FC236}">
+                <a16:creationId xmlns:a16="http://schemas.microsoft.com/office/drawing/2014/main" id="{9991BD1F-9242-9D45-E4F9-F0A0BF686445}"/>
+              </a:ext>
+            </a:extLst>
+          </p:cNvPr>
+          <p:cNvSpPr/>
+          <p:nvPr/>
+        </p:nvSpPr>
+        <p:spPr>
+          <a:xfrm>
+            <a:off x="5538744" y="30478"/>
+            <a:ext cx="3327464" cy="6845378"/>
+          </a:xfrm>
+          <a:prstGeom prst="rect">
+            <a:avLst/>
+          </a:prstGeom>
+          <a:gradFill flip="none" rotWithShape="1">
+            <a:gsLst>
+              <a:gs pos="100000">
+                <a:srgbClr val="FF6D85"/>
+              </a:gs>
+              <a:gs pos="0">
+                <a:srgbClr val="FFA3B2"/>
+              </a:gs>
+              <a:gs pos="57000">
+                <a:srgbClr val="FFA3B2"/>
+              </a:gs>
+            </a:gsLst>
+            <a:lin ang="2700000" scaled="1"/>
+            <a:tileRect/>
+          </a:gradFill>
+          <a:ln>
+            <a:solidFill>
+              <a:schemeClr val="accent1">
+                <a:shade val="15000"/>
+              </a:schemeClr>
+            </a:solidFill>
+          </a:ln>
+        </p:spPr>
+        <p:style>
+          <a:lnRef idx="2">
+            <a:schemeClr val="accent1">
+              <a:shade val="15000"/>
+            </a:schemeClr>
+          </a:lnRef>
+          <a:fillRef idx="1">
+            <a:schemeClr val="accent1"/>
+          </a:fillRef>
+          <a:effectRef idx="0">
+            <a:schemeClr val="accent1"/>
+          </a:effectRef>
+          <a:fontRef idx="minor">
+            <a:schemeClr val="lt1"/>
+          </a:fontRef>
+        </p:style>
+        <p:txBody>
+          <a:bodyPr rtlCol="0" anchor="ctr"/>
+          <a:lstStyle/>
+          <a:p>
+            <a:pPr algn="ctr"/>
+            <a:endParaRPr lang="en-US" dirty="0"/>
+          </a:p>
+        </p:txBody>
+      </p:sp>
+      <p:sp>
+        <p:nvSpPr>
+          <p:cNvPr id="2" name="Rectangle 1">
+            <a:extLst>
+              <a:ext uri="{FF2B5EF4-FFF2-40B4-BE49-F238E27FC236}">
+                <a16:creationId xmlns:a16="http://schemas.microsoft.com/office/drawing/2014/main" id="{9C32D7BB-CEC7-C5E6-37E7-875C5FC0D5A6}"/>
+              </a:ext>
+            </a:extLst>
+          </p:cNvPr>
+          <p:cNvSpPr/>
+          <p:nvPr/>
+        </p:nvSpPr>
+        <p:spPr>
+          <a:xfrm>
+            <a:off x="2846344" y="30480"/>
+            <a:ext cx="2692400" cy="6974093"/>
+          </a:xfrm>
+          <a:prstGeom prst="rect">
+            <a:avLst/>
+          </a:prstGeom>
+          <a:solidFill>
+            <a:schemeClr val="bg1"/>
+          </a:solidFill>
+        </p:spPr>
+        <p:style>
+          <a:lnRef idx="2">
+            <a:schemeClr val="accent1">
+              <a:shade val="15000"/>
+            </a:schemeClr>
+          </a:lnRef>
+          <a:fillRef idx="1">
+            <a:schemeClr val="accent1"/>
+          </a:fillRef>
+          <a:effectRef idx="0">
+            <a:schemeClr val="accent1"/>
+          </a:effectRef>
+          <a:fontRef idx="minor">
+            <a:schemeClr val="lt1"/>
+          </a:fontRef>
+        </p:style>
+        <p:txBody>
+          <a:bodyPr rtlCol="0" anchor="ctr"/>
+          <a:lstStyle/>
+          <a:p>
+            <a:pPr algn="ctr"/>
+            <a:endParaRPr lang="en-US"/>
+          </a:p>
+        </p:txBody>
+      </p:sp>
+      <p:sp>
+        <p:nvSpPr>
+          <p:cNvPr id="3" name="Rectangle 2">
+            <a:extLst>
+              <a:ext uri="{FF2B5EF4-FFF2-40B4-BE49-F238E27FC236}">
+                <a16:creationId xmlns:a16="http://schemas.microsoft.com/office/drawing/2014/main" id="{50B93905-58CF-44FC-57F1-B08C73065D8A}"/>
+              </a:ext>
+            </a:extLst>
+          </p:cNvPr>
+          <p:cNvSpPr/>
+          <p:nvPr/>
+        </p:nvSpPr>
+        <p:spPr>
+          <a:xfrm>
+            <a:off x="3567146" y="6875855"/>
+            <a:ext cx="6172224" cy="2436957"/>
+          </a:xfrm>
+          <a:prstGeom prst="rect">
+            <a:avLst/>
+          </a:prstGeom>
+          <a:solidFill>
+            <a:schemeClr val="bg1"/>
+          </a:solidFill>
+        </p:spPr>
+        <p:style>
+          <a:lnRef idx="2">
+            <a:schemeClr val="accent1">
+              <a:shade val="15000"/>
+            </a:schemeClr>
+          </a:lnRef>
+          <a:fillRef idx="1">
+            <a:schemeClr val="accent1"/>
+          </a:fillRef>
+          <a:effectRef idx="0">
+            <a:schemeClr val="accent1"/>
+          </a:effectRef>
+          <a:fontRef idx="minor">
+            <a:schemeClr val="lt1"/>
+          </a:fontRef>
+        </p:style>
+        <p:txBody>
+          <a:bodyPr rtlCol="0" anchor="ctr"/>
+          <a:lstStyle/>
+          <a:p>
+            <a:pPr algn="ctr"/>
+            <a:endParaRPr lang="en-US"/>
+          </a:p>
+        </p:txBody>
+      </p:sp>
+      <p:sp>
+        <p:nvSpPr>
+          <p:cNvPr id="5" name="Rectangle 4">
+            <a:extLst>
+              <a:ext uri="{FF2B5EF4-FFF2-40B4-BE49-F238E27FC236}">
+                <a16:creationId xmlns:a16="http://schemas.microsoft.com/office/drawing/2014/main" id="{87BA5DE8-2A68-2A76-1A84-DB6EB7AC1367}"/>
+              </a:ext>
+            </a:extLst>
+          </p:cNvPr>
+          <p:cNvSpPr/>
+          <p:nvPr/>
+        </p:nvSpPr>
+        <p:spPr>
+          <a:xfrm>
+            <a:off x="8866206" y="22318"/>
+            <a:ext cx="3880631" cy="6845376"/>
+          </a:xfrm>
+          <a:prstGeom prst="rect">
+            <a:avLst/>
+          </a:prstGeom>
+          <a:solidFill>
+            <a:schemeClr val="bg1"/>
+          </a:solidFill>
+        </p:spPr>
+        <p:style>
+          <a:lnRef idx="2">
+            <a:schemeClr val="accent1">
+              <a:shade val="15000"/>
+            </a:schemeClr>
+          </a:lnRef>
+          <a:fillRef idx="1">
+            <a:schemeClr val="accent1"/>
+          </a:fillRef>
+          <a:effectRef idx="0">
+            <a:schemeClr val="accent1"/>
+          </a:effectRef>
+          <a:fontRef idx="minor">
+            <a:schemeClr val="lt1"/>
+          </a:fontRef>
+        </p:style>
+        <p:txBody>
+          <a:bodyPr rtlCol="0" anchor="ctr"/>
+          <a:lstStyle/>
+          <a:p>
+            <a:pPr algn="ctr"/>
+            <a:endParaRPr lang="en-US"/>
+          </a:p>
+        </p:txBody>
+      </p:sp>
+      <p:sp>
+        <p:nvSpPr>
+          <p:cNvPr id="4" name="Rectangle 3">
+            <a:extLst>
+              <a:ext uri="{FF2B5EF4-FFF2-40B4-BE49-F238E27FC236}">
+                <a16:creationId xmlns:a16="http://schemas.microsoft.com/office/drawing/2014/main" id="{C85CB94B-6781-A916-D0BB-B91AC152F02C}"/>
+              </a:ext>
+            </a:extLst>
+          </p:cNvPr>
+          <p:cNvSpPr/>
+          <p:nvPr/>
+        </p:nvSpPr>
+        <p:spPr>
+          <a:xfrm>
+            <a:off x="5693715" y="1806482"/>
+            <a:ext cx="3017520" cy="3017520"/>
+          </a:xfrm>
+          <a:prstGeom prst="rect">
+            <a:avLst/>
+          </a:prstGeom>
+          <a:solidFill>
+            <a:srgbClr val="FFD5DE"/>
+          </a:solidFill>
+          <a:ln>
+            <a:noFill/>
+          </a:ln>
+        </p:spPr>
+        <p:style>
+          <a:lnRef idx="2">
+            <a:schemeClr val="accent1">
+              <a:shade val="15000"/>
+            </a:schemeClr>
+          </a:lnRef>
+          <a:fillRef idx="1">
+            <a:schemeClr val="accent1"/>
+          </a:fillRef>
+          <a:effectRef idx="0">
+            <a:schemeClr val="accent1"/>
+          </a:effectRef>
+          <a:fontRef idx="minor">
+            <a:schemeClr val="lt1"/>
+          </a:fontRef>
+        </p:style>
+        <p:txBody>
+          <a:bodyPr rtlCol="0" anchor="ctr"/>
+          <a:lstStyle/>
+          <a:p>
+            <a:pPr algn="ctr"/>
+            <a:endParaRPr lang="en-US"/>
+          </a:p>
+        </p:txBody>
+      </p:sp>
+      <p:sp>
+        <p:nvSpPr>
+          <p:cNvPr id="6" name="Rectangle 5">
+            <a:extLst>
+              <a:ext uri="{FF2B5EF4-FFF2-40B4-BE49-F238E27FC236}">
+                <a16:creationId xmlns:a16="http://schemas.microsoft.com/office/drawing/2014/main" id="{BBADFC67-727E-53FA-A47F-3458472232D4}"/>
+              </a:ext>
+            </a:extLst>
+          </p:cNvPr>
+          <p:cNvSpPr/>
+          <p:nvPr/>
+        </p:nvSpPr>
+        <p:spPr>
+          <a:xfrm>
+            <a:off x="5693715" y="1806481"/>
+            <a:ext cx="1005840" cy="1005840"/>
+          </a:xfrm>
+          <a:prstGeom prst="rect">
+            <a:avLst/>
+          </a:prstGeom>
+          <a:solidFill>
+            <a:srgbClr val="FCE3E9"/>
+          </a:solidFill>
+          <a:ln>
+            <a:noFill/>
+          </a:ln>
+        </p:spPr>
+        <p:style>
+          <a:lnRef idx="2">
+            <a:schemeClr val="accent1">
+              <a:shade val="15000"/>
+            </a:schemeClr>
+          </a:lnRef>
+          <a:fillRef idx="1">
+            <a:schemeClr val="accent1"/>
+          </a:fillRef>
+          <a:effectRef idx="0">
+            <a:schemeClr val="accent1"/>
+          </a:effectRef>
+          <a:fontRef idx="minor">
+            <a:schemeClr val="lt1"/>
+          </a:fontRef>
+        </p:style>
+        <p:txBody>
+          <a:bodyPr rtlCol="0" anchor="ctr"/>
+          <a:lstStyle/>
+          <a:p>
+            <a:pPr algn="ctr"/>
+            <a:endParaRPr lang="en-US"/>
+          </a:p>
+        </p:txBody>
+      </p:sp>
+      <p:sp>
+        <p:nvSpPr>
+          <p:cNvPr id="7" name="Rectangle 6">
+            <a:extLst>
+              <a:ext uri="{FF2B5EF4-FFF2-40B4-BE49-F238E27FC236}">
+                <a16:creationId xmlns:a16="http://schemas.microsoft.com/office/drawing/2014/main" id="{9B2D550E-E556-2981-0BC1-FF16DF1B33D4}"/>
+              </a:ext>
+            </a:extLst>
+          </p:cNvPr>
+          <p:cNvSpPr/>
+          <p:nvPr/>
+        </p:nvSpPr>
+        <p:spPr>
+          <a:xfrm>
+            <a:off x="6699555" y="2812321"/>
+            <a:ext cx="1005840" cy="1005840"/>
+          </a:xfrm>
+          <a:prstGeom prst="rect">
+            <a:avLst/>
+          </a:prstGeom>
+          <a:solidFill>
+            <a:srgbClr val="FCE3E9"/>
+          </a:solidFill>
+          <a:ln>
+            <a:noFill/>
+          </a:ln>
+        </p:spPr>
+        <p:style>
+          <a:lnRef idx="2">
+            <a:schemeClr val="accent1">
+              <a:shade val="15000"/>
+            </a:schemeClr>
+          </a:lnRef>
+          <a:fillRef idx="1">
+            <a:schemeClr val="accent1"/>
+          </a:fillRef>
+          <a:effectRef idx="0">
+            <a:schemeClr val="accent1"/>
+          </a:effectRef>
+          <a:fontRef idx="minor">
+            <a:schemeClr val="lt1"/>
+          </a:fontRef>
+        </p:style>
+        <p:txBody>
+          <a:bodyPr rtlCol="0" anchor="ctr"/>
+          <a:lstStyle/>
+          <a:p>
+            <a:pPr algn="ctr"/>
+            <a:endParaRPr lang="en-US"/>
+          </a:p>
+        </p:txBody>
+      </p:sp>
+      <p:sp>
+        <p:nvSpPr>
+          <p:cNvPr id="8" name="Rectangle 7">
+            <a:extLst>
+              <a:ext uri="{FF2B5EF4-FFF2-40B4-BE49-F238E27FC236}">
+                <a16:creationId xmlns:a16="http://schemas.microsoft.com/office/drawing/2014/main" id="{EE78FF09-C636-F773-5F29-92A3DA3C629F}"/>
+              </a:ext>
+            </a:extLst>
+          </p:cNvPr>
+          <p:cNvSpPr/>
+          <p:nvPr/>
+        </p:nvSpPr>
+        <p:spPr>
+          <a:xfrm>
+            <a:off x="7700512" y="3818160"/>
+            <a:ext cx="1005840" cy="1005840"/>
+          </a:xfrm>
+          <a:prstGeom prst="rect">
+            <a:avLst/>
+          </a:prstGeom>
+          <a:solidFill>
+            <a:srgbClr val="FCE3E9"/>
+          </a:solidFill>
+          <a:ln>
+            <a:noFill/>
+          </a:ln>
+        </p:spPr>
+        <p:style>
+          <a:lnRef idx="2">
+            <a:schemeClr val="accent1">
+              <a:shade val="15000"/>
+            </a:schemeClr>
+          </a:lnRef>
+          <a:fillRef idx="1">
+            <a:schemeClr val="accent1"/>
+          </a:fillRef>
+          <a:effectRef idx="0">
+            <a:schemeClr val="accent1"/>
+          </a:effectRef>
+          <a:fontRef idx="minor">
+            <a:schemeClr val="lt1"/>
+          </a:fontRef>
+        </p:style>
+        <p:txBody>
+          <a:bodyPr rtlCol="0" anchor="ctr"/>
+          <a:lstStyle/>
+          <a:p>
+            <a:pPr algn="ctr"/>
+            <a:endParaRPr lang="en-US"/>
+          </a:p>
+        </p:txBody>
+      </p:sp>
+      <p:sp>
+        <p:nvSpPr>
+          <p:cNvPr id="9" name="Rectangle 8">
+            <a:extLst>
+              <a:ext uri="{FF2B5EF4-FFF2-40B4-BE49-F238E27FC236}">
+                <a16:creationId xmlns:a16="http://schemas.microsoft.com/office/drawing/2014/main" id="{0B3CE79F-6CF5-E2C5-31D9-F1DC25376D23}"/>
+              </a:ext>
+            </a:extLst>
+          </p:cNvPr>
+          <p:cNvSpPr/>
+          <p:nvPr/>
+        </p:nvSpPr>
+        <p:spPr>
+          <a:xfrm>
+            <a:off x="7700512" y="1806481"/>
+            <a:ext cx="1005840" cy="1005840"/>
+          </a:xfrm>
+          <a:prstGeom prst="rect">
+            <a:avLst/>
+          </a:prstGeom>
+          <a:solidFill>
+            <a:srgbClr val="FCE3E9"/>
+          </a:solidFill>
+          <a:ln>
+            <a:noFill/>
+          </a:ln>
+        </p:spPr>
+        <p:style>
+          <a:lnRef idx="2">
+            <a:schemeClr val="accent1">
+              <a:shade val="15000"/>
+            </a:schemeClr>
+          </a:lnRef>
+          <a:fillRef idx="1">
+            <a:schemeClr val="accent1"/>
+          </a:fillRef>
+          <a:effectRef idx="0">
+            <a:schemeClr val="accent1"/>
+          </a:effectRef>
+          <a:fontRef idx="minor">
+            <a:schemeClr val="lt1"/>
+          </a:fontRef>
+        </p:style>
+        <p:txBody>
+          <a:bodyPr rtlCol="0" anchor="ctr"/>
+          <a:lstStyle/>
+          <a:p>
+            <a:pPr algn="ctr"/>
+            <a:endParaRPr lang="en-US"/>
+          </a:p>
+        </p:txBody>
+      </p:sp>
+      <p:sp>
+        <p:nvSpPr>
+          <p:cNvPr id="10" name="Rectangle 9">
+            <a:extLst>
+              <a:ext uri="{FF2B5EF4-FFF2-40B4-BE49-F238E27FC236}">
+                <a16:creationId xmlns:a16="http://schemas.microsoft.com/office/drawing/2014/main" id="{32E6E336-D567-03AC-C81B-AF884B2CC023}"/>
+              </a:ext>
+            </a:extLst>
+          </p:cNvPr>
+          <p:cNvSpPr/>
+          <p:nvPr/>
+        </p:nvSpPr>
+        <p:spPr>
+          <a:xfrm>
+            <a:off x="5688832" y="3818160"/>
+            <a:ext cx="1005840" cy="1005840"/>
+          </a:xfrm>
+          <a:prstGeom prst="rect">
+            <a:avLst/>
+          </a:prstGeom>
+          <a:solidFill>
+            <a:srgbClr val="FCE3E9"/>
+          </a:solidFill>
+          <a:ln>
+            <a:noFill/>
+          </a:ln>
+        </p:spPr>
+        <p:style>
+          <a:lnRef idx="2">
+            <a:schemeClr val="accent1">
+              <a:shade val="15000"/>
+            </a:schemeClr>
+          </a:lnRef>
+          <a:fillRef idx="1">
+            <a:schemeClr val="accent1"/>
+          </a:fillRef>
+          <a:effectRef idx="0">
+            <a:schemeClr val="accent1"/>
+          </a:effectRef>
+          <a:fontRef idx="minor">
+            <a:schemeClr val="lt1"/>
+          </a:fontRef>
+        </p:style>
+        <p:txBody>
+          <a:bodyPr rtlCol="0" anchor="ctr"/>
+          <a:lstStyle/>
+          <a:p>
+            <a:pPr algn="ctr"/>
+            <a:endParaRPr lang="en-US"/>
+          </a:p>
+        </p:txBody>
+      </p:sp>
+      <p:sp>
+        <p:nvSpPr>
+          <p:cNvPr id="15" name="Rectangle: Rounded Corners 14">
+            <a:extLst>
+              <a:ext uri="{FF2B5EF4-FFF2-40B4-BE49-F238E27FC236}">
+                <a16:creationId xmlns:a16="http://schemas.microsoft.com/office/drawing/2014/main" id="{79D0BCE8-D05E-EAED-01FC-A197CA2FC912}"/>
+              </a:ext>
+            </a:extLst>
+          </p:cNvPr>
+          <p:cNvSpPr/>
+          <p:nvPr/>
+        </p:nvSpPr>
+        <p:spPr>
+          <a:xfrm>
+            <a:off x="6444711" y="324646"/>
+            <a:ext cx="1526917" cy="498713"/>
+          </a:xfrm>
+          <a:prstGeom prst="roundRect">
+            <a:avLst/>
+          </a:prstGeom>
+          <a:solidFill>
+            <a:srgbClr val="FF617B"/>
+          </a:solidFill>
+        </p:spPr>
+        <p:style>
+          <a:lnRef idx="2">
+            <a:schemeClr val="accent1">
+              <a:shade val="15000"/>
+            </a:schemeClr>
+          </a:lnRef>
+          <a:fillRef idx="1">
+            <a:schemeClr val="accent1"/>
+          </a:fillRef>
+          <a:effectRef idx="0">
+            <a:schemeClr val="accent1"/>
+          </a:effectRef>
+          <a:fontRef idx="minor">
+            <a:schemeClr val="lt1"/>
+          </a:fontRef>
+        </p:style>
+        <p:txBody>
+          <a:bodyPr rtlCol="0" anchor="ctr"/>
+          <a:lstStyle/>
+          <a:p>
+            <a:pPr algn="ctr"/>
+            <a:r>
+              <a:rPr lang="en-US" dirty="0">
+                <a:pattFill prst="pct5">
+                  <a:fgClr>
+                    <a:schemeClr val="lt1"/>
+                  </a:fgClr>
+                  <a:bgClr>
+                    <a:schemeClr val="bg1"/>
+                  </a:bgClr>
+                </a:pattFill>
+              </a:rPr>
+              <a:t>123:12</a:t>
+            </a:r>
+          </a:p>
+        </p:txBody>
+      </p:sp>
+      <p:sp>
+        <p:nvSpPr>
+          <p:cNvPr id="31" name="Oval 30">
+            <a:extLst>
+              <a:ext uri="{FF2B5EF4-FFF2-40B4-BE49-F238E27FC236}">
+                <a16:creationId xmlns:a16="http://schemas.microsoft.com/office/drawing/2014/main" id="{40A40A18-42FF-EED2-8772-F92A674D22C0}"/>
+              </a:ext>
+            </a:extLst>
+          </p:cNvPr>
+          <p:cNvSpPr/>
+          <p:nvPr/>
+        </p:nvSpPr>
+        <p:spPr>
+          <a:xfrm>
+            <a:off x="5650758" y="319114"/>
+            <a:ext cx="498713" cy="498713"/>
+          </a:xfrm>
+          <a:prstGeom prst="ellipse">
+            <a:avLst/>
+          </a:prstGeom>
+          <a:solidFill>
+            <a:srgbClr val="FF617B"/>
+          </a:solidFill>
+        </p:spPr>
+        <p:style>
+          <a:lnRef idx="2">
+            <a:schemeClr val="accent1">
+              <a:shade val="15000"/>
+            </a:schemeClr>
+          </a:lnRef>
+          <a:fillRef idx="1">
+            <a:schemeClr val="accent1"/>
+          </a:fillRef>
+          <a:effectRef idx="0">
+            <a:schemeClr val="accent1"/>
+          </a:effectRef>
+          <a:fontRef idx="minor">
+            <a:schemeClr val="lt1"/>
+          </a:fontRef>
+        </p:style>
+        <p:txBody>
+          <a:bodyPr rtlCol="0" anchor="ctr"/>
+          <a:lstStyle/>
+          <a:p>
+            <a:pPr algn="ctr"/>
+            <a:endParaRPr lang="en-US"/>
+          </a:p>
+        </p:txBody>
+      </p:sp>
+      <p:sp>
+        <p:nvSpPr>
+          <p:cNvPr id="35" name="Oval 34">
+            <a:extLst>
+              <a:ext uri="{FF2B5EF4-FFF2-40B4-BE49-F238E27FC236}">
+                <a16:creationId xmlns:a16="http://schemas.microsoft.com/office/drawing/2014/main" id="{4C9A03EE-EFD9-EF44-1828-8EAD2DF99AAC}"/>
+              </a:ext>
+            </a:extLst>
+          </p:cNvPr>
+          <p:cNvSpPr/>
+          <p:nvPr/>
+        </p:nvSpPr>
+        <p:spPr>
+          <a:xfrm>
+            <a:off x="8264103" y="319114"/>
+            <a:ext cx="498713" cy="498713"/>
+          </a:xfrm>
+          <a:prstGeom prst="ellipse">
+            <a:avLst/>
+          </a:prstGeom>
+          <a:solidFill>
+            <a:srgbClr val="FF617B"/>
+          </a:solidFill>
+        </p:spPr>
+        <p:style>
+          <a:lnRef idx="2">
+            <a:schemeClr val="accent1">
+              <a:shade val="15000"/>
+            </a:schemeClr>
+          </a:lnRef>
+          <a:fillRef idx="1">
+            <a:schemeClr val="accent1"/>
+          </a:fillRef>
+          <a:effectRef idx="0">
+            <a:schemeClr val="accent1"/>
+          </a:effectRef>
+          <a:fontRef idx="minor">
+            <a:schemeClr val="lt1"/>
+          </a:fontRef>
+        </p:style>
+        <p:txBody>
+          <a:bodyPr rtlCol="0" anchor="ctr"/>
+          <a:lstStyle/>
+          <a:p>
+            <a:pPr algn="ctr"/>
+            <a:endParaRPr lang="en-US"/>
+          </a:p>
+        </p:txBody>
+      </p:sp>
+      <p:sp>
+        <p:nvSpPr>
+          <p:cNvPr id="36" name="Rectangle: Rounded Corners 35">
+            <a:extLst>
+              <a:ext uri="{FF2B5EF4-FFF2-40B4-BE49-F238E27FC236}">
+                <a16:creationId xmlns:a16="http://schemas.microsoft.com/office/drawing/2014/main" id="{507B62CD-851F-7A22-699D-09FB039F70A8}"/>
+              </a:ext>
+            </a:extLst>
+          </p:cNvPr>
+          <p:cNvSpPr/>
+          <p:nvPr/>
+        </p:nvSpPr>
+        <p:spPr>
+          <a:xfrm>
+            <a:off x="5898199" y="1116833"/>
+            <a:ext cx="2608552" cy="544289"/>
+          </a:xfrm>
+          <a:prstGeom prst="roundRect">
+            <a:avLst/>
+          </a:prstGeom>
+          <a:solidFill>
+            <a:srgbClr val="FF617B"/>
+          </a:solidFill>
+        </p:spPr>
+        <p:style>
+          <a:lnRef idx="2">
+            <a:schemeClr val="accent1">
+              <a:shade val="15000"/>
+            </a:schemeClr>
+          </a:lnRef>
+          <a:fillRef idx="1">
+            <a:schemeClr val="accent1"/>
+          </a:fillRef>
+          <a:effectRef idx="0">
+            <a:schemeClr val="accent1"/>
+          </a:effectRef>
+          <a:fontRef idx="minor">
+            <a:schemeClr val="lt1"/>
+          </a:fontRef>
+        </p:style>
+        <p:txBody>
+          <a:bodyPr rtlCol="0" anchor="ctr"/>
+          <a:lstStyle/>
+          <a:p>
+            <a:pPr algn="ctr"/>
+            <a:endParaRPr lang="en-US"/>
+          </a:p>
+        </p:txBody>
+      </p:sp>
+      <p:sp>
+        <p:nvSpPr>
+          <p:cNvPr id="37" name="Rectangle: Rounded Corners 36">
+            <a:extLst>
+              <a:ext uri="{FF2B5EF4-FFF2-40B4-BE49-F238E27FC236}">
+                <a16:creationId xmlns:a16="http://schemas.microsoft.com/office/drawing/2014/main" id="{1DCD0EAC-CD28-0C30-0DA7-A1EED5B8C52B}"/>
+              </a:ext>
+            </a:extLst>
+          </p:cNvPr>
+          <p:cNvSpPr/>
+          <p:nvPr/>
+        </p:nvSpPr>
+        <p:spPr>
+          <a:xfrm>
+            <a:off x="5587145" y="5410950"/>
+            <a:ext cx="261885" cy="418889"/>
+          </a:xfrm>
+          <a:prstGeom prst="roundRect">
+            <a:avLst/>
+          </a:prstGeom>
+          <a:solidFill>
+            <a:srgbClr val="FF617B"/>
+          </a:solidFill>
+        </p:spPr>
+        <p:style>
+          <a:lnRef idx="2">
+            <a:schemeClr val="accent1">
+              <a:shade val="15000"/>
+            </a:schemeClr>
+          </a:lnRef>
+          <a:fillRef idx="1">
+            <a:schemeClr val="accent1"/>
+          </a:fillRef>
+          <a:effectRef idx="0">
+            <a:schemeClr val="accent1"/>
+          </a:effectRef>
+          <a:fontRef idx="minor">
+            <a:schemeClr val="lt1"/>
+          </a:fontRef>
+        </p:style>
+        <p:txBody>
+          <a:bodyPr rtlCol="0" anchor="ctr"/>
+          <a:lstStyle/>
+          <a:p>
+            <a:pPr algn="ctr"/>
+            <a:endParaRPr lang="en-US"/>
+          </a:p>
+        </p:txBody>
+      </p:sp>
+      <p:sp>
+        <p:nvSpPr>
+          <p:cNvPr id="38" name="Rectangle: Rounded Corners 37">
+            <a:extLst>
+              <a:ext uri="{FF2B5EF4-FFF2-40B4-BE49-F238E27FC236}">
+                <a16:creationId xmlns:a16="http://schemas.microsoft.com/office/drawing/2014/main" id="{91E8BD8E-9A48-2981-1013-89F0CFD41442}"/>
+              </a:ext>
+            </a:extLst>
+          </p:cNvPr>
+          <p:cNvSpPr/>
+          <p:nvPr/>
+        </p:nvSpPr>
+        <p:spPr>
+          <a:xfrm>
+            <a:off x="5946600" y="5411592"/>
+            <a:ext cx="261885" cy="418889"/>
+          </a:xfrm>
+          <a:prstGeom prst="roundRect">
+            <a:avLst/>
+          </a:prstGeom>
+          <a:solidFill>
+            <a:srgbClr val="FF617B"/>
+          </a:solidFill>
+        </p:spPr>
+        <p:style>
+          <a:lnRef idx="2">
+            <a:schemeClr val="accent1">
+              <a:shade val="15000"/>
+            </a:schemeClr>
+          </a:lnRef>
+          <a:fillRef idx="1">
+            <a:schemeClr val="accent1"/>
+          </a:fillRef>
+          <a:effectRef idx="0">
+            <a:schemeClr val="accent1"/>
+          </a:effectRef>
+          <a:fontRef idx="minor">
+            <a:schemeClr val="lt1"/>
+          </a:fontRef>
+        </p:style>
+        <p:txBody>
+          <a:bodyPr rtlCol="0" anchor="ctr"/>
+          <a:lstStyle/>
+          <a:p>
+            <a:pPr algn="ctr"/>
+            <a:endParaRPr lang="en-US"/>
+          </a:p>
+        </p:txBody>
+      </p:sp>
+      <p:sp>
+        <p:nvSpPr>
+          <p:cNvPr id="39" name="Rectangle: Rounded Corners 38">
+            <a:extLst>
+              <a:ext uri="{FF2B5EF4-FFF2-40B4-BE49-F238E27FC236}">
+                <a16:creationId xmlns:a16="http://schemas.microsoft.com/office/drawing/2014/main" id="{3F0B261E-9405-9777-C7E2-2F181D68DA32}"/>
+              </a:ext>
+            </a:extLst>
+          </p:cNvPr>
+          <p:cNvSpPr/>
+          <p:nvPr/>
+        </p:nvSpPr>
+        <p:spPr>
+          <a:xfrm>
+            <a:off x="6340449" y="5410949"/>
+            <a:ext cx="261885" cy="418889"/>
+          </a:xfrm>
+          <a:prstGeom prst="roundRect">
+            <a:avLst/>
+          </a:prstGeom>
+          <a:solidFill>
+            <a:srgbClr val="FF617B"/>
+          </a:solidFill>
+        </p:spPr>
+        <p:style>
+          <a:lnRef idx="2">
+            <a:schemeClr val="accent1">
+              <a:shade val="15000"/>
+            </a:schemeClr>
+          </a:lnRef>
+          <a:fillRef idx="1">
+            <a:schemeClr val="accent1"/>
+          </a:fillRef>
+          <a:effectRef idx="0">
+            <a:schemeClr val="accent1"/>
+          </a:effectRef>
+          <a:fontRef idx="minor">
+            <a:schemeClr val="lt1"/>
+          </a:fontRef>
+        </p:style>
+        <p:txBody>
+          <a:bodyPr rtlCol="0" anchor="ctr"/>
+          <a:lstStyle/>
+          <a:p>
+            <a:pPr algn="ctr"/>
+            <a:endParaRPr lang="en-US"/>
+          </a:p>
+        </p:txBody>
+      </p:sp>
+      <p:sp>
+        <p:nvSpPr>
+          <p:cNvPr id="40" name="Rectangle: Rounded Corners 39">
+            <a:extLst>
+              <a:ext uri="{FF2B5EF4-FFF2-40B4-BE49-F238E27FC236}">
+                <a16:creationId xmlns:a16="http://schemas.microsoft.com/office/drawing/2014/main" id="{0F659CF6-3327-62F6-8CEE-6D6E81EFA7FC}"/>
+              </a:ext>
+            </a:extLst>
+          </p:cNvPr>
+          <p:cNvSpPr/>
+          <p:nvPr/>
+        </p:nvSpPr>
+        <p:spPr>
+          <a:xfrm>
+            <a:off x="6703363" y="5410949"/>
+            <a:ext cx="261885" cy="418889"/>
+          </a:xfrm>
+          <a:prstGeom prst="roundRect">
+            <a:avLst/>
+          </a:prstGeom>
+          <a:solidFill>
+            <a:srgbClr val="FF617B"/>
+          </a:solidFill>
+        </p:spPr>
+        <p:style>
+          <a:lnRef idx="2">
+            <a:schemeClr val="accent1">
+              <a:shade val="15000"/>
+            </a:schemeClr>
+          </a:lnRef>
+          <a:fillRef idx="1">
+            <a:schemeClr val="accent1"/>
+          </a:fillRef>
+          <a:effectRef idx="0">
+            <a:schemeClr val="accent1"/>
+          </a:effectRef>
+          <a:fontRef idx="minor">
+            <a:schemeClr val="lt1"/>
+          </a:fontRef>
+        </p:style>
+        <p:txBody>
+          <a:bodyPr rtlCol="0" anchor="ctr"/>
+          <a:lstStyle/>
+          <a:p>
+            <a:pPr algn="ctr"/>
+            <a:endParaRPr lang="en-US"/>
+          </a:p>
+        </p:txBody>
+      </p:sp>
+      <p:sp>
+        <p:nvSpPr>
+          <p:cNvPr id="41" name="Rectangle: Rounded Corners 40">
+            <a:extLst>
+              <a:ext uri="{FF2B5EF4-FFF2-40B4-BE49-F238E27FC236}">
+                <a16:creationId xmlns:a16="http://schemas.microsoft.com/office/drawing/2014/main" id="{B41CD4DD-976E-F09A-7374-33531C82DB73}"/>
+              </a:ext>
+            </a:extLst>
+          </p:cNvPr>
+          <p:cNvSpPr/>
+          <p:nvPr/>
+        </p:nvSpPr>
+        <p:spPr>
+          <a:xfrm>
+            <a:off x="7072233" y="5410948"/>
+            <a:ext cx="261885" cy="418889"/>
+          </a:xfrm>
+          <a:prstGeom prst="roundRect">
+            <a:avLst/>
+          </a:prstGeom>
+          <a:solidFill>
+            <a:srgbClr val="FF617B"/>
+          </a:solidFill>
+        </p:spPr>
+        <p:style>
+          <a:lnRef idx="2">
+            <a:schemeClr val="accent1">
+              <a:shade val="15000"/>
+            </a:schemeClr>
+          </a:lnRef>
+          <a:fillRef idx="1">
+            <a:schemeClr val="accent1"/>
+          </a:fillRef>
+          <a:effectRef idx="0">
+            <a:schemeClr val="accent1"/>
+          </a:effectRef>
+          <a:fontRef idx="minor">
+            <a:schemeClr val="lt1"/>
+          </a:fontRef>
+        </p:style>
+        <p:txBody>
+          <a:bodyPr rtlCol="0" anchor="ctr"/>
+          <a:lstStyle/>
+          <a:p>
+            <a:pPr algn="ctr"/>
+            <a:endParaRPr lang="en-US"/>
+          </a:p>
+        </p:txBody>
+      </p:sp>
+      <p:sp>
+        <p:nvSpPr>
+          <p:cNvPr id="42" name="Rectangle: Rounded Corners 41">
+            <a:extLst>
+              <a:ext uri="{FF2B5EF4-FFF2-40B4-BE49-F238E27FC236}">
+                <a16:creationId xmlns:a16="http://schemas.microsoft.com/office/drawing/2014/main" id="{8F421B2D-1E7A-007F-ECAE-5C8E49C90226}"/>
+              </a:ext>
+            </a:extLst>
+          </p:cNvPr>
+          <p:cNvSpPr/>
+          <p:nvPr/>
+        </p:nvSpPr>
+        <p:spPr>
+          <a:xfrm>
+            <a:off x="7429238" y="5410948"/>
+            <a:ext cx="261885" cy="418889"/>
+          </a:xfrm>
+          <a:prstGeom prst="roundRect">
+            <a:avLst/>
+          </a:prstGeom>
+          <a:solidFill>
+            <a:srgbClr val="FF617B"/>
+          </a:solidFill>
+        </p:spPr>
+        <p:style>
+          <a:lnRef idx="2">
+            <a:schemeClr val="accent1">
+              <a:shade val="15000"/>
+            </a:schemeClr>
+          </a:lnRef>
+          <a:fillRef idx="1">
+            <a:schemeClr val="accent1"/>
+          </a:fillRef>
+          <a:effectRef idx="0">
+            <a:schemeClr val="accent1"/>
+          </a:effectRef>
+          <a:fontRef idx="minor">
+            <a:schemeClr val="lt1"/>
+          </a:fontRef>
+        </p:style>
+        <p:txBody>
+          <a:bodyPr rtlCol="0" anchor="ctr"/>
+          <a:lstStyle/>
+          <a:p>
+            <a:pPr algn="ctr"/>
+            <a:endParaRPr lang="en-US"/>
+          </a:p>
+        </p:txBody>
+      </p:sp>
+      <p:sp>
+        <p:nvSpPr>
+          <p:cNvPr id="43" name="Rectangle: Rounded Corners 42">
+            <a:extLst>
+              <a:ext uri="{FF2B5EF4-FFF2-40B4-BE49-F238E27FC236}">
+                <a16:creationId xmlns:a16="http://schemas.microsoft.com/office/drawing/2014/main" id="{363DA9B0-952E-D6AB-D655-2E8E67083C33}"/>
+              </a:ext>
+            </a:extLst>
+          </p:cNvPr>
+          <p:cNvSpPr/>
+          <p:nvPr/>
+        </p:nvSpPr>
+        <p:spPr>
+          <a:xfrm>
+            <a:off x="7817987" y="5410948"/>
+            <a:ext cx="261885" cy="418889"/>
+          </a:xfrm>
+          <a:prstGeom prst="roundRect">
+            <a:avLst/>
+          </a:prstGeom>
+          <a:solidFill>
+            <a:srgbClr val="FF617B"/>
+          </a:solidFill>
+        </p:spPr>
+        <p:style>
+          <a:lnRef idx="2">
+            <a:schemeClr val="accent1">
+              <a:shade val="15000"/>
+            </a:schemeClr>
+          </a:lnRef>
+          <a:fillRef idx="1">
+            <a:schemeClr val="accent1"/>
+          </a:fillRef>
+          <a:effectRef idx="0">
+            <a:schemeClr val="accent1"/>
+          </a:effectRef>
+          <a:fontRef idx="minor">
+            <a:schemeClr val="lt1"/>
+          </a:fontRef>
+        </p:style>
+        <p:txBody>
+          <a:bodyPr rtlCol="0" anchor="ctr"/>
+          <a:lstStyle/>
+          <a:p>
+            <a:pPr algn="ctr"/>
+            <a:endParaRPr lang="en-US"/>
+          </a:p>
+        </p:txBody>
+      </p:sp>
+      <p:sp>
+        <p:nvSpPr>
+          <p:cNvPr id="44" name="Rectangle: Rounded Corners 43">
+            <a:extLst>
+              <a:ext uri="{FF2B5EF4-FFF2-40B4-BE49-F238E27FC236}">
+                <a16:creationId xmlns:a16="http://schemas.microsoft.com/office/drawing/2014/main" id="{5F74EAF9-BFE9-42EC-E533-FAEF0FE2C4DD}"/>
+              </a:ext>
+            </a:extLst>
+          </p:cNvPr>
+          <p:cNvSpPr/>
+          <p:nvPr/>
+        </p:nvSpPr>
+        <p:spPr>
+          <a:xfrm>
+            <a:off x="8203432" y="5410947"/>
+            <a:ext cx="261885" cy="418889"/>
+          </a:xfrm>
+          <a:prstGeom prst="roundRect">
+            <a:avLst/>
+          </a:prstGeom>
+          <a:solidFill>
+            <a:srgbClr val="FF617B"/>
+          </a:solidFill>
+        </p:spPr>
+        <p:style>
+          <a:lnRef idx="2">
+            <a:schemeClr val="accent1">
+              <a:shade val="15000"/>
+            </a:schemeClr>
+          </a:lnRef>
+          <a:fillRef idx="1">
+            <a:schemeClr val="accent1"/>
+          </a:fillRef>
+          <a:effectRef idx="0">
+            <a:schemeClr val="accent1"/>
+          </a:effectRef>
+          <a:fontRef idx="minor">
+            <a:schemeClr val="lt1"/>
+          </a:fontRef>
+        </p:style>
+        <p:txBody>
+          <a:bodyPr rtlCol="0" anchor="ctr"/>
+          <a:lstStyle/>
+          <a:p>
+            <a:pPr algn="ctr"/>
+            <a:endParaRPr lang="en-US"/>
+          </a:p>
+        </p:txBody>
+      </p:sp>
+      <p:sp>
+        <p:nvSpPr>
+          <p:cNvPr id="45" name="Rectangle: Rounded Corners 44">
+            <a:extLst>
+              <a:ext uri="{FF2B5EF4-FFF2-40B4-BE49-F238E27FC236}">
+                <a16:creationId xmlns:a16="http://schemas.microsoft.com/office/drawing/2014/main" id="{E49DAAAA-3CF8-7451-354C-F029C60564E4}"/>
+              </a:ext>
+            </a:extLst>
+          </p:cNvPr>
+          <p:cNvSpPr/>
+          <p:nvPr/>
+        </p:nvSpPr>
+        <p:spPr>
+          <a:xfrm>
+            <a:off x="8559347" y="5410946"/>
+            <a:ext cx="261885" cy="418889"/>
+          </a:xfrm>
+          <a:prstGeom prst="roundRect">
+            <a:avLst/>
+          </a:prstGeom>
+          <a:solidFill>
+            <a:srgbClr val="FF617B"/>
+          </a:solidFill>
+        </p:spPr>
+        <p:style>
+          <a:lnRef idx="2">
+            <a:schemeClr val="accent1">
+              <a:shade val="15000"/>
+            </a:schemeClr>
+          </a:lnRef>
+          <a:fillRef idx="1">
+            <a:schemeClr val="accent1"/>
+          </a:fillRef>
+          <a:effectRef idx="0">
+            <a:schemeClr val="accent1"/>
+          </a:effectRef>
+          <a:fontRef idx="minor">
+            <a:schemeClr val="lt1"/>
+          </a:fontRef>
+        </p:style>
+        <p:txBody>
+          <a:bodyPr rtlCol="0" anchor="ctr"/>
+          <a:lstStyle/>
+          <a:p>
+            <a:pPr algn="ctr"/>
+            <a:endParaRPr lang="en-US"/>
+          </a:p>
+        </p:txBody>
+      </p:sp>
+    </p:spTree>
+    <p:extLst>
+      <p:ext uri="{BB962C8B-B14F-4D97-AF65-F5344CB8AC3E}">
+        <p14:creationId xmlns:p14="http://schemas.microsoft.com/office/powerpoint/2010/main" val="1929019414"/>
+      </p:ext>
+    </p:extLst>
+  </p:cSld>
+  <p:clrMapOvr>
+    <a:masterClrMapping/>
+  </p:clrMapOvr>
+</p:sld>
+</file>
+
+<file path=ppt/slides/slide8.xml><?xml version="1.0" encoding="utf-8"?>
+<p:sld xmlns:a="http://schemas.openxmlformats.org/drawingml/2006/main" xmlns:r="http://schemas.openxmlformats.org/officeDocument/2006/relationships" xmlns:p="http://schemas.openxmlformats.org/presentationml/2006/main">
+  <p:cSld>
+    <p:spTree>
+      <p:nvGrpSpPr>
+        <p:cNvPr id="1" name="">
+          <a:extLst>
+            <a:ext uri="{FF2B5EF4-FFF2-40B4-BE49-F238E27FC236}">
+              <a16:creationId xmlns:a16="http://schemas.microsoft.com/office/drawing/2014/main" id="{E99C115B-C1ED-3EC1-51E5-14846CF5BC8A}"/>
+            </a:ext>
+          </a:extLst>
+        </p:cNvPr>
+        <p:cNvGrpSpPr/>
+        <p:nvPr/>
+      </p:nvGrpSpPr>
+      <p:grpSpPr>
+        <a:xfrm>
+          <a:off x="0" y="0"/>
+          <a:ext cx="0" cy="0"/>
+          <a:chOff x="0" y="0"/>
+          <a:chExt cx="0" cy="0"/>
+        </a:xfrm>
+      </p:grpSpPr>
+      <p:sp>
+        <p:nvSpPr>
+          <p:cNvPr id="11" name="Rectangle 10">
+            <a:extLst>
+              <a:ext uri="{FF2B5EF4-FFF2-40B4-BE49-F238E27FC236}">
+                <a16:creationId xmlns:a16="http://schemas.microsoft.com/office/drawing/2014/main" id="{98FD6C11-9F37-5909-A89B-6562E97D52BF}"/>
+              </a:ext>
+            </a:extLst>
+          </p:cNvPr>
+          <p:cNvSpPr/>
+          <p:nvPr/>
+        </p:nvSpPr>
+        <p:spPr>
+          <a:xfrm>
+            <a:off x="5538744" y="30478"/>
+            <a:ext cx="3327464" cy="6845378"/>
+          </a:xfrm>
+          <a:prstGeom prst="rect">
+            <a:avLst/>
+          </a:prstGeom>
+          <a:gradFill flip="none" rotWithShape="1">
+            <a:gsLst>
+              <a:gs pos="100000">
+                <a:srgbClr val="FFB5C1"/>
+              </a:gs>
+              <a:gs pos="0">
+                <a:srgbClr val="FCE3E9"/>
+              </a:gs>
+              <a:gs pos="100000">
+                <a:srgbClr val="FF617B"/>
+              </a:gs>
+            </a:gsLst>
+            <a:lin ang="2700000" scaled="1"/>
+            <a:tileRect/>
+          </a:gradFill>
+          <a:ln>
+            <a:solidFill>
+              <a:schemeClr val="accent1">
+                <a:shade val="15000"/>
+              </a:schemeClr>
+            </a:solidFill>
+          </a:ln>
+        </p:spPr>
+        <p:style>
+          <a:lnRef idx="2">
+            <a:schemeClr val="accent1">
+              <a:shade val="15000"/>
+            </a:schemeClr>
+          </a:lnRef>
+          <a:fillRef idx="1">
+            <a:schemeClr val="accent1"/>
+          </a:fillRef>
+          <a:effectRef idx="0">
+            <a:schemeClr val="accent1"/>
+          </a:effectRef>
+          <a:fontRef idx="minor">
+            <a:schemeClr val="lt1"/>
+          </a:fontRef>
+        </p:style>
+        <p:txBody>
+          <a:bodyPr rtlCol="0" anchor="ctr"/>
+          <a:lstStyle/>
+          <a:p>
+            <a:pPr algn="ctr"/>
+            <a:endParaRPr lang="en-US" dirty="0"/>
+          </a:p>
+        </p:txBody>
+      </p:sp>
+      <p:sp>
+        <p:nvSpPr>
+          <p:cNvPr id="12" name="Oval 11">
+            <a:extLst>
+              <a:ext uri="{FF2B5EF4-FFF2-40B4-BE49-F238E27FC236}">
+                <a16:creationId xmlns:a16="http://schemas.microsoft.com/office/drawing/2014/main" id="{900D1992-3F48-F4B0-9113-887147E015B8}"/>
+              </a:ext>
+            </a:extLst>
+          </p:cNvPr>
+          <p:cNvSpPr/>
+          <p:nvPr/>
+        </p:nvSpPr>
+        <p:spPr>
+          <a:xfrm>
+            <a:off x="4485310" y="702586"/>
+            <a:ext cx="2985670" cy="2229684"/>
+          </a:xfrm>
+          <a:prstGeom prst="ellipse">
+            <a:avLst/>
+          </a:prstGeom>
+          <a:solidFill>
+            <a:srgbClr val="FCE3E9"/>
+          </a:solidFill>
+          <a:ln>
+            <a:noFill/>
+          </a:ln>
+        </p:spPr>
+        <p:style>
+          <a:lnRef idx="2">
+            <a:schemeClr val="accent1">
+              <a:shade val="15000"/>
+            </a:schemeClr>
+          </a:lnRef>
+          <a:fillRef idx="1">
+            <a:schemeClr val="accent1"/>
+          </a:fillRef>
+          <a:effectRef idx="0">
+            <a:schemeClr val="accent1"/>
+          </a:effectRef>
+          <a:fontRef idx="minor">
+            <a:schemeClr val="lt1"/>
+          </a:fontRef>
+        </p:style>
+        <p:txBody>
+          <a:bodyPr rtlCol="0" anchor="ctr"/>
+          <a:lstStyle/>
+          <a:p>
+            <a:pPr algn="ctr"/>
+            <a:endParaRPr lang="en-US" dirty="0"/>
+          </a:p>
+        </p:txBody>
+      </p:sp>
+      <p:sp>
+        <p:nvSpPr>
+          <p:cNvPr id="13" name="Oval 12">
+            <a:extLst>
+              <a:ext uri="{FF2B5EF4-FFF2-40B4-BE49-F238E27FC236}">
+                <a16:creationId xmlns:a16="http://schemas.microsoft.com/office/drawing/2014/main" id="{845F23B9-7F6E-BDFD-27B0-322183A00489}"/>
+              </a:ext>
+            </a:extLst>
+          </p:cNvPr>
+          <p:cNvSpPr/>
+          <p:nvPr/>
+        </p:nvSpPr>
+        <p:spPr>
+          <a:xfrm>
+            <a:off x="6376483" y="1252664"/>
+            <a:ext cx="4783184" cy="4544285"/>
+          </a:xfrm>
+          <a:prstGeom prst="ellipse">
+            <a:avLst/>
+          </a:prstGeom>
+          <a:solidFill>
+            <a:srgbClr val="FCE3E9"/>
+          </a:solidFill>
+          <a:ln>
+            <a:noFill/>
+          </a:ln>
+        </p:spPr>
+        <p:style>
+          <a:lnRef idx="2">
+            <a:schemeClr val="accent1">
+              <a:shade val="15000"/>
+            </a:schemeClr>
+          </a:lnRef>
+          <a:fillRef idx="1">
+            <a:schemeClr val="accent1"/>
+          </a:fillRef>
+          <a:effectRef idx="0">
+            <a:schemeClr val="accent1"/>
+          </a:effectRef>
+          <a:fontRef idx="minor">
+            <a:schemeClr val="lt1"/>
+          </a:fontRef>
+        </p:style>
+        <p:txBody>
+          <a:bodyPr rtlCol="0" anchor="ctr"/>
+          <a:lstStyle/>
+          <a:p>
+            <a:pPr algn="ctr"/>
+            <a:endParaRPr lang="en-US" dirty="0"/>
+          </a:p>
+        </p:txBody>
+      </p:sp>
+      <p:sp>
+        <p:nvSpPr>
+          <p:cNvPr id="14" name="Oval 13">
+            <a:extLst>
+              <a:ext uri="{FF2B5EF4-FFF2-40B4-BE49-F238E27FC236}">
+                <a16:creationId xmlns:a16="http://schemas.microsoft.com/office/drawing/2014/main" id="{54AA551B-6108-4D19-4C7E-A3720CFC92F4}"/>
+              </a:ext>
+            </a:extLst>
+          </p:cNvPr>
+          <p:cNvSpPr/>
+          <p:nvPr/>
+        </p:nvSpPr>
+        <p:spPr>
+          <a:xfrm>
+            <a:off x="4526696" y="4479152"/>
+            <a:ext cx="4818960" cy="4022035"/>
+          </a:xfrm>
+          <a:prstGeom prst="ellipse">
+            <a:avLst/>
+          </a:prstGeom>
+          <a:solidFill>
+            <a:srgbClr val="FFD5DE"/>
+          </a:solidFill>
+          <a:ln>
+            <a:noFill/>
+          </a:ln>
+        </p:spPr>
+        <p:style>
+          <a:lnRef idx="2">
+            <a:schemeClr val="accent1">
+              <a:shade val="15000"/>
+            </a:schemeClr>
+          </a:lnRef>
+          <a:fillRef idx="1">
+            <a:schemeClr val="accent1"/>
+          </a:fillRef>
+          <a:effectRef idx="0">
+            <a:schemeClr val="accent1"/>
+          </a:effectRef>
+          <a:fontRef idx="minor">
+            <a:schemeClr val="lt1"/>
+          </a:fontRef>
+        </p:style>
+        <p:txBody>
+          <a:bodyPr rtlCol="0" anchor="ctr"/>
+          <a:lstStyle/>
+          <a:p>
+            <a:pPr algn="ctr"/>
+            <a:endParaRPr lang="en-US" dirty="0"/>
+          </a:p>
+        </p:txBody>
+      </p:sp>
+      <p:sp>
+        <p:nvSpPr>
+          <p:cNvPr id="2" name="Rectangle 1">
+            <a:extLst>
+              <a:ext uri="{FF2B5EF4-FFF2-40B4-BE49-F238E27FC236}">
+                <a16:creationId xmlns:a16="http://schemas.microsoft.com/office/drawing/2014/main" id="{4CBCC4FA-8B85-D083-59FD-964A84EEAA2D}"/>
+              </a:ext>
+            </a:extLst>
+          </p:cNvPr>
+          <p:cNvSpPr/>
+          <p:nvPr/>
+        </p:nvSpPr>
+        <p:spPr>
+          <a:xfrm>
+            <a:off x="2846344" y="30480"/>
+            <a:ext cx="2692400" cy="6974093"/>
+          </a:xfrm>
+          <a:prstGeom prst="rect">
+            <a:avLst/>
+          </a:prstGeom>
+          <a:solidFill>
+            <a:schemeClr val="bg1"/>
+          </a:solidFill>
+        </p:spPr>
+        <p:style>
+          <a:lnRef idx="2">
+            <a:schemeClr val="accent1">
+              <a:shade val="15000"/>
+            </a:schemeClr>
+          </a:lnRef>
+          <a:fillRef idx="1">
+            <a:schemeClr val="accent1"/>
+          </a:fillRef>
+          <a:effectRef idx="0">
+            <a:schemeClr val="accent1"/>
+          </a:effectRef>
+          <a:fontRef idx="minor">
+            <a:schemeClr val="lt1"/>
+          </a:fontRef>
+        </p:style>
+        <p:txBody>
+          <a:bodyPr rtlCol="0" anchor="ctr"/>
+          <a:lstStyle/>
+          <a:p>
+            <a:pPr algn="ctr"/>
+            <a:endParaRPr lang="en-US"/>
+          </a:p>
+        </p:txBody>
+      </p:sp>
+      <p:sp>
+        <p:nvSpPr>
+          <p:cNvPr id="3" name="Rectangle 2">
+            <a:extLst>
+              <a:ext uri="{FF2B5EF4-FFF2-40B4-BE49-F238E27FC236}">
+                <a16:creationId xmlns:a16="http://schemas.microsoft.com/office/drawing/2014/main" id="{071970AB-A114-BA5B-7BB5-97A6E4E49926}"/>
+              </a:ext>
+            </a:extLst>
+          </p:cNvPr>
+          <p:cNvSpPr/>
+          <p:nvPr/>
+        </p:nvSpPr>
+        <p:spPr>
+          <a:xfrm>
+            <a:off x="3567146" y="6875855"/>
+            <a:ext cx="6172224" cy="2436957"/>
+          </a:xfrm>
+          <a:prstGeom prst="rect">
+            <a:avLst/>
+          </a:prstGeom>
+          <a:solidFill>
+            <a:schemeClr val="bg1"/>
+          </a:solidFill>
+        </p:spPr>
+        <p:style>
+          <a:lnRef idx="2">
+            <a:schemeClr val="accent1">
+              <a:shade val="15000"/>
+            </a:schemeClr>
+          </a:lnRef>
+          <a:fillRef idx="1">
+            <a:schemeClr val="accent1"/>
+          </a:fillRef>
+          <a:effectRef idx="0">
+            <a:schemeClr val="accent1"/>
+          </a:effectRef>
+          <a:fontRef idx="minor">
+            <a:schemeClr val="lt1"/>
+          </a:fontRef>
+        </p:style>
+        <p:txBody>
+          <a:bodyPr rtlCol="0" anchor="ctr"/>
+          <a:lstStyle/>
+          <a:p>
+            <a:pPr algn="ctr"/>
+            <a:endParaRPr lang="en-US"/>
+          </a:p>
+        </p:txBody>
+      </p:sp>
+      <p:sp>
+        <p:nvSpPr>
+          <p:cNvPr id="5" name="Rectangle 4">
+            <a:extLst>
+              <a:ext uri="{FF2B5EF4-FFF2-40B4-BE49-F238E27FC236}">
+                <a16:creationId xmlns:a16="http://schemas.microsoft.com/office/drawing/2014/main" id="{0ADC00E6-1F25-81F8-1B70-B82D822B03EB}"/>
+              </a:ext>
+            </a:extLst>
+          </p:cNvPr>
+          <p:cNvSpPr/>
+          <p:nvPr/>
+        </p:nvSpPr>
+        <p:spPr>
+          <a:xfrm>
+            <a:off x="8866207" y="30478"/>
+            <a:ext cx="3880631" cy="6845376"/>
+          </a:xfrm>
+          <a:prstGeom prst="rect">
+            <a:avLst/>
+          </a:prstGeom>
+          <a:solidFill>
+            <a:schemeClr val="bg1"/>
+          </a:solidFill>
+        </p:spPr>
+        <p:style>
+          <a:lnRef idx="2">
+            <a:schemeClr val="accent1">
+              <a:shade val="15000"/>
+            </a:schemeClr>
+          </a:lnRef>
+          <a:fillRef idx="1">
+            <a:schemeClr val="accent1"/>
+          </a:fillRef>
+          <a:effectRef idx="0">
+            <a:schemeClr val="accent1"/>
+          </a:effectRef>
+          <a:fontRef idx="minor">
+            <a:schemeClr val="lt1"/>
+          </a:fontRef>
+        </p:style>
+        <p:txBody>
+          <a:bodyPr rtlCol="0" anchor="ctr"/>
+          <a:lstStyle/>
+          <a:p>
+            <a:pPr algn="ctr"/>
+            <a:endParaRPr lang="en-US"/>
+          </a:p>
+        </p:txBody>
+      </p:sp>
+      <p:sp>
+        <p:nvSpPr>
+          <p:cNvPr id="18" name="Freeform: Shape 17">
+            <a:extLst>
+              <a:ext uri="{FF2B5EF4-FFF2-40B4-BE49-F238E27FC236}">
+                <a16:creationId xmlns:a16="http://schemas.microsoft.com/office/drawing/2014/main" id="{5D43D897-8A4F-CE46-C3AF-3D25BABC35A2}"/>
+              </a:ext>
+            </a:extLst>
+          </p:cNvPr>
+          <p:cNvSpPr/>
+          <p:nvPr/>
+        </p:nvSpPr>
+        <p:spPr>
+          <a:xfrm>
+            <a:off x="5914536" y="722633"/>
+            <a:ext cx="2748954" cy="2211876"/>
+          </a:xfrm>
+          <a:custGeom>
+            <a:avLst/>
+            <a:gdLst>
+              <a:gd name="connsiteX0" fmla="*/ 262210 w 2748954"/>
+              <a:gd name="connsiteY0" fmla="*/ 223456 h 2211876"/>
+              <a:gd name="connsiteX1" fmla="*/ 262210 w 2748954"/>
+              <a:gd name="connsiteY1" fmla="*/ 1909381 h 2211876"/>
+              <a:gd name="connsiteX2" fmla="*/ 2662510 w 2748954"/>
+              <a:gd name="connsiteY2" fmla="*/ 2052256 h 2211876"/>
+              <a:gd name="connsiteX3" fmla="*/ 2033860 w 2748954"/>
+              <a:gd name="connsiteY3" fmla="*/ 213931 h 2211876"/>
+              <a:gd name="connsiteX4" fmla="*/ 262210 w 2748954"/>
+              <a:gd name="connsiteY4" fmla="*/ 223456 h 2211876"/>
+            </a:gdLst>
+            <a:ahLst/>
+            <a:cxnLst>
+              <a:cxn ang="0">
+                <a:pos x="connsiteX0" y="connsiteY0"/>
+              </a:cxn>
+              <a:cxn ang="0">
+                <a:pos x="connsiteX1" y="connsiteY1"/>
+              </a:cxn>
+              <a:cxn ang="0">
+                <a:pos x="connsiteX2" y="connsiteY2"/>
+              </a:cxn>
+              <a:cxn ang="0">
+                <a:pos x="connsiteX3" y="connsiteY3"/>
+              </a:cxn>
+              <a:cxn ang="0">
+                <a:pos x="connsiteX4" y="connsiteY4"/>
+              </a:cxn>
+            </a:cxnLst>
+            <a:rect l="l" t="t" r="r" b="b"/>
+            <a:pathLst>
+              <a:path w="2748954" h="2211876">
+                <a:moveTo>
+                  <a:pt x="262210" y="223456"/>
+                </a:moveTo>
+                <a:cubicBezTo>
+                  <a:pt x="-33065" y="506031"/>
+                  <a:pt x="-137840" y="1604581"/>
+                  <a:pt x="262210" y="1909381"/>
+                </a:cubicBezTo>
+                <a:cubicBezTo>
+                  <a:pt x="662260" y="2214181"/>
+                  <a:pt x="2367235" y="2334831"/>
+                  <a:pt x="2662510" y="2052256"/>
+                </a:cubicBezTo>
+                <a:cubicBezTo>
+                  <a:pt x="2957785" y="1769681"/>
+                  <a:pt x="2433910" y="513968"/>
+                  <a:pt x="2033860" y="213931"/>
+                </a:cubicBezTo>
+                <a:cubicBezTo>
+                  <a:pt x="1633810" y="-86106"/>
+                  <a:pt x="557485" y="-59119"/>
+                  <a:pt x="262210" y="223456"/>
+                </a:cubicBezTo>
+                <a:close/>
+              </a:path>
+            </a:pathLst>
+          </a:custGeom>
+          <a:solidFill>
+            <a:schemeClr val="bg1"/>
+          </a:solidFill>
+        </p:spPr>
+        <p:style>
+          <a:lnRef idx="2">
+            <a:schemeClr val="accent1">
+              <a:shade val="15000"/>
+            </a:schemeClr>
+          </a:lnRef>
+          <a:fillRef idx="1">
+            <a:schemeClr val="accent1"/>
+          </a:fillRef>
+          <a:effectRef idx="0">
+            <a:schemeClr val="accent1"/>
+          </a:effectRef>
+          <a:fontRef idx="minor">
+            <a:schemeClr val="lt1"/>
+          </a:fontRef>
+        </p:style>
+        <p:txBody>
+          <a:bodyPr rtlCol="0" anchor="ctr"/>
+          <a:lstStyle/>
+          <a:p>
+            <a:pPr algn="ctr"/>
+            <a:endParaRPr lang="en-US"/>
+          </a:p>
+        </p:txBody>
+      </p:sp>
+      <p:sp>
+        <p:nvSpPr>
+          <p:cNvPr id="26" name="TextBox 25">
+            <a:extLst>
+              <a:ext uri="{FF2B5EF4-FFF2-40B4-BE49-F238E27FC236}">
+                <a16:creationId xmlns:a16="http://schemas.microsoft.com/office/drawing/2014/main" id="{8C4270D7-2B31-F449-A993-ACE707948B07}"/>
+              </a:ext>
+            </a:extLst>
+          </p:cNvPr>
+          <p:cNvSpPr txBox="1"/>
+          <p:nvPr/>
+        </p:nvSpPr>
+        <p:spPr>
+          <a:xfrm>
+            <a:off x="5625049" y="2091861"/>
+            <a:ext cx="1211434" cy="830997"/>
+          </a:xfrm>
+          <a:prstGeom prst="rect">
+            <a:avLst/>
+          </a:prstGeom>
+          <a:noFill/>
+          <a:effectLst>
+            <a:outerShdw blurRad="190500" dist="38100" algn="l" rotWithShape="0">
+              <a:prstClr val="black">
+                <a:alpha val="28000"/>
+              </a:prstClr>
+            </a:outerShdw>
+            <a:softEdge rad="127000"/>
+          </a:effectLst>
+          <a:scene3d>
+            <a:camera prst="isometricRightUp">
+              <a:rot lat="1200000" lon="21594000" rev="2400000"/>
+            </a:camera>
+            <a:lightRig rig="threePt" dir="t"/>
+          </a:scene3d>
+        </p:spPr>
+        <p:txBody>
+          <a:bodyPr wrap="square" rtlCol="0">
+            <a:spAutoFit/>
+          </a:bodyPr>
+          <a:lstStyle/>
+          <a:p>
+            <a:r>
+              <a:rPr lang="en-US" sz="4800" b="1" dirty="0">
+                <a:solidFill>
+                  <a:schemeClr val="bg1"/>
+                </a:solidFill>
+                <a:latin typeface="ADLaM Display" panose="02010000000000000000" pitchFamily="2" charset="0"/>
+                <a:ea typeface="ADLaM Display" panose="02010000000000000000" pitchFamily="2" charset="0"/>
+                <a:cs typeface="ADLaM Display" panose="02010000000000000000" pitchFamily="2" charset="0"/>
+              </a:rPr>
+              <a:t>2</a:t>
+            </a:r>
+          </a:p>
+        </p:txBody>
+      </p:sp>
+      <p:sp>
+        <p:nvSpPr>
+          <p:cNvPr id="23" name="TextBox 22">
+            <a:extLst>
+              <a:ext uri="{FF2B5EF4-FFF2-40B4-BE49-F238E27FC236}">
+                <a16:creationId xmlns:a16="http://schemas.microsoft.com/office/drawing/2014/main" id="{A0950F98-437E-6CEF-9FEF-528985ABB700}"/>
+              </a:ext>
+            </a:extLst>
+          </p:cNvPr>
+          <p:cNvSpPr txBox="1"/>
+          <p:nvPr/>
+        </p:nvSpPr>
+        <p:spPr>
+          <a:xfrm>
+            <a:off x="5492782" y="5746559"/>
+            <a:ext cx="1211434" cy="830997"/>
+          </a:xfrm>
+          <a:prstGeom prst="rect">
+            <a:avLst/>
+          </a:prstGeom>
+          <a:noFill/>
+          <a:effectLst>
+            <a:outerShdw blurRad="190500" dist="38100" algn="l" rotWithShape="0">
+              <a:prstClr val="black">
+                <a:alpha val="28000"/>
+              </a:prstClr>
+            </a:outerShdw>
+            <a:softEdge rad="127000"/>
+          </a:effectLst>
+          <a:scene3d>
+            <a:camera prst="isometricRightUp">
+              <a:rot lat="1800000" lon="20400000" rev="600000"/>
+            </a:camera>
+            <a:lightRig rig="threePt" dir="t"/>
+          </a:scene3d>
+        </p:spPr>
+        <p:txBody>
+          <a:bodyPr wrap="square" rtlCol="0">
+            <a:spAutoFit/>
+          </a:bodyPr>
+          <a:lstStyle/>
+          <a:p>
+            <a:r>
+              <a:rPr lang="en-US" sz="4800" b="1" dirty="0">
+                <a:solidFill>
+                  <a:schemeClr val="bg1"/>
+                </a:solidFill>
+                <a:latin typeface="ADLaM Display" panose="02010000000000000000" pitchFamily="2" charset="0"/>
+                <a:ea typeface="ADLaM Display" panose="02010000000000000000" pitchFamily="2" charset="0"/>
+                <a:cs typeface="ADLaM Display" panose="02010000000000000000" pitchFamily="2" charset="0"/>
+              </a:rPr>
+              <a:t>7</a:t>
+            </a:r>
+          </a:p>
+        </p:txBody>
+      </p:sp>
+      <p:sp>
+        <p:nvSpPr>
+          <p:cNvPr id="24" name="TextBox 23">
+            <a:extLst>
+              <a:ext uri="{FF2B5EF4-FFF2-40B4-BE49-F238E27FC236}">
+                <a16:creationId xmlns:a16="http://schemas.microsoft.com/office/drawing/2014/main" id="{5E96BAE5-4DDD-5111-9450-04A1AFD4ADC9}"/>
+              </a:ext>
+            </a:extLst>
+          </p:cNvPr>
+          <p:cNvSpPr txBox="1"/>
+          <p:nvPr/>
+        </p:nvSpPr>
+        <p:spPr>
+          <a:xfrm>
+            <a:off x="7822357" y="2540590"/>
+            <a:ext cx="1211434" cy="1323439"/>
+          </a:xfrm>
+          <a:prstGeom prst="rect">
+            <a:avLst/>
+          </a:prstGeom>
+          <a:noFill/>
+          <a:effectLst>
+            <a:outerShdw blurRad="190500" dist="38100" algn="l" rotWithShape="0">
+              <a:prstClr val="black">
+                <a:alpha val="28000"/>
+              </a:prstClr>
+            </a:outerShdw>
+            <a:softEdge rad="127000"/>
+          </a:effectLst>
+          <a:scene3d>
+            <a:camera prst="isometricRightUp">
+              <a:rot lat="9000000" lon="12000000" rev="9000000"/>
+            </a:camera>
+            <a:lightRig rig="threePt" dir="t"/>
+          </a:scene3d>
+        </p:spPr>
+        <p:txBody>
+          <a:bodyPr wrap="square" rtlCol="0">
+            <a:spAutoFit/>
+          </a:bodyPr>
+          <a:lstStyle/>
+          <a:p>
+            <a:r>
+              <a:rPr lang="en-US" sz="8000" b="1" dirty="0">
+                <a:solidFill>
+                  <a:schemeClr val="bg1"/>
+                </a:solidFill>
+                <a:latin typeface="ADLaM Display" panose="02010000000000000000" pitchFamily="2" charset="0"/>
+                <a:ea typeface="ADLaM Display" panose="02010000000000000000" pitchFamily="2" charset="0"/>
+                <a:cs typeface="ADLaM Display" panose="02010000000000000000" pitchFamily="2" charset="0"/>
+              </a:rPr>
+              <a:t>9</a:t>
+            </a:r>
+          </a:p>
+        </p:txBody>
+      </p:sp>
+      <p:sp>
+        <p:nvSpPr>
+          <p:cNvPr id="25" name="TextBox 24">
+            <a:extLst>
+              <a:ext uri="{FF2B5EF4-FFF2-40B4-BE49-F238E27FC236}">
+                <a16:creationId xmlns:a16="http://schemas.microsoft.com/office/drawing/2014/main" id="{20C6E023-061E-8882-7BBE-F7C9C7BAEFAC}"/>
+              </a:ext>
+            </a:extLst>
+          </p:cNvPr>
+          <p:cNvSpPr txBox="1"/>
+          <p:nvPr/>
+        </p:nvSpPr>
+        <p:spPr>
+          <a:xfrm>
+            <a:off x="7848335" y="4887614"/>
+            <a:ext cx="1211434" cy="830997"/>
+          </a:xfrm>
+          <a:prstGeom prst="rect">
+            <a:avLst/>
+          </a:prstGeom>
+          <a:noFill/>
+          <a:effectLst>
+            <a:outerShdw blurRad="190500" dist="38100" algn="l" rotWithShape="0">
+              <a:prstClr val="black">
+                <a:alpha val="28000"/>
+              </a:prstClr>
+            </a:outerShdw>
+            <a:softEdge rad="127000"/>
+          </a:effectLst>
+          <a:scene3d>
+            <a:camera prst="isometricRightUp">
+              <a:rot lat="9000000" lon="12000000" rev="1800000"/>
+            </a:camera>
+            <a:lightRig rig="threePt" dir="t"/>
+          </a:scene3d>
+        </p:spPr>
+        <p:txBody>
+          <a:bodyPr wrap="square" rtlCol="0">
+            <a:spAutoFit/>
+          </a:bodyPr>
+          <a:lstStyle/>
+          <a:p>
+            <a:r>
+              <a:rPr lang="en-US" sz="4800" b="1" dirty="0">
+                <a:solidFill>
+                  <a:schemeClr val="bg1"/>
+                </a:solidFill>
+                <a:latin typeface="ADLaM Display" panose="02010000000000000000" pitchFamily="2" charset="0"/>
+                <a:ea typeface="ADLaM Display" panose="02010000000000000000" pitchFamily="2" charset="0"/>
+                <a:cs typeface="ADLaM Display" panose="02010000000000000000" pitchFamily="2" charset="0"/>
+              </a:rPr>
+              <a:t>8</a:t>
+            </a:r>
+          </a:p>
+        </p:txBody>
+      </p:sp>
+      <p:sp>
+        <p:nvSpPr>
+          <p:cNvPr id="27" name="TextBox 26">
+            <a:extLst>
+              <a:ext uri="{FF2B5EF4-FFF2-40B4-BE49-F238E27FC236}">
+                <a16:creationId xmlns:a16="http://schemas.microsoft.com/office/drawing/2014/main" id="{9BD25742-0007-4B86-6BC2-5BB8DA406AEA}"/>
+              </a:ext>
+            </a:extLst>
+          </p:cNvPr>
+          <p:cNvSpPr txBox="1"/>
+          <p:nvPr/>
+        </p:nvSpPr>
+        <p:spPr>
+          <a:xfrm>
+            <a:off x="6328539" y="2976594"/>
+            <a:ext cx="1211434" cy="830997"/>
+          </a:xfrm>
+          <a:prstGeom prst="rect">
+            <a:avLst/>
+          </a:prstGeom>
+          <a:noFill/>
+          <a:effectLst>
+            <a:outerShdw blurRad="38100" dist="558800" algn="l" rotWithShape="0">
+              <a:prstClr val="black">
+                <a:alpha val="93000"/>
+              </a:prstClr>
+            </a:outerShdw>
+            <a:softEdge rad="127000"/>
+          </a:effectLst>
+          <a:scene3d>
+            <a:camera prst="isometricRightUp">
+              <a:rot lat="2433751" lon="19169909" rev="1118621"/>
+            </a:camera>
+            <a:lightRig rig="threePt" dir="t"/>
+          </a:scene3d>
+        </p:spPr>
+        <p:txBody>
+          <a:bodyPr wrap="square" rtlCol="0">
+            <a:spAutoFit/>
+          </a:bodyPr>
+          <a:lstStyle/>
+          <a:p>
+            <a:r>
+              <a:rPr lang="en-US" sz="4800" b="1" dirty="0">
+                <a:solidFill>
+                  <a:schemeClr val="bg1"/>
+                </a:solidFill>
+                <a:latin typeface="ADLaM Display" panose="02010000000000000000" pitchFamily="2" charset="0"/>
+                <a:ea typeface="ADLaM Display" panose="02010000000000000000" pitchFamily="2" charset="0"/>
+                <a:cs typeface="ADLaM Display" panose="02010000000000000000" pitchFamily="2" charset="0"/>
+              </a:rPr>
+              <a:t>3</a:t>
+            </a:r>
+          </a:p>
+        </p:txBody>
+      </p:sp>
+      <p:sp>
+        <p:nvSpPr>
+          <p:cNvPr id="28" name="TextBox 27">
+            <a:extLst>
+              <a:ext uri="{FF2B5EF4-FFF2-40B4-BE49-F238E27FC236}">
+                <a16:creationId xmlns:a16="http://schemas.microsoft.com/office/drawing/2014/main" id="{2EF732BE-8110-A019-259A-83B748D31F46}"/>
+              </a:ext>
+            </a:extLst>
+          </p:cNvPr>
+          <p:cNvSpPr txBox="1"/>
+          <p:nvPr/>
+        </p:nvSpPr>
+        <p:spPr>
+          <a:xfrm>
+            <a:off x="7782333" y="26579"/>
+            <a:ext cx="1211434" cy="400110"/>
+          </a:xfrm>
+          <a:prstGeom prst="rect">
+            <a:avLst/>
+          </a:prstGeom>
+          <a:noFill/>
+          <a:effectLst>
+            <a:outerShdw blurRad="190500" dist="38100" algn="l" rotWithShape="0">
+              <a:prstClr val="black">
+                <a:alpha val="28000"/>
+              </a:prstClr>
+            </a:outerShdw>
+            <a:softEdge rad="127000"/>
+          </a:effectLst>
+          <a:scene3d>
+            <a:camera prst="isometricRightUp">
+              <a:rot lat="0" lon="20400000" rev="0"/>
+            </a:camera>
+            <a:lightRig rig="threePt" dir="t"/>
+          </a:scene3d>
+        </p:spPr>
+        <p:txBody>
+          <a:bodyPr wrap="square" rtlCol="0">
+            <a:spAutoFit/>
+          </a:bodyPr>
+          <a:lstStyle/>
+          <a:p>
+            <a:r>
+              <a:rPr lang="en-US" sz="2000" b="1" dirty="0">
+                <a:solidFill>
+                  <a:schemeClr val="bg1"/>
+                </a:solidFill>
+                <a:latin typeface="ADLaM Display" panose="02010000000000000000" pitchFamily="2" charset="0"/>
+                <a:ea typeface="ADLaM Display" panose="02010000000000000000" pitchFamily="2" charset="0"/>
+                <a:cs typeface="ADLaM Display" panose="02010000000000000000" pitchFamily="2" charset="0"/>
+              </a:rPr>
+              <a:t>1</a:t>
+            </a:r>
+          </a:p>
+        </p:txBody>
+      </p:sp>
+      <p:sp>
+        <p:nvSpPr>
+          <p:cNvPr id="29" name="TextBox 28">
+            <a:extLst>
+              <a:ext uri="{FF2B5EF4-FFF2-40B4-BE49-F238E27FC236}">
+                <a16:creationId xmlns:a16="http://schemas.microsoft.com/office/drawing/2014/main" id="{6F80AEDB-052E-08A7-6B2C-B2DE304DDE49}"/>
+              </a:ext>
+            </a:extLst>
+          </p:cNvPr>
+          <p:cNvSpPr txBox="1"/>
+          <p:nvPr/>
+        </p:nvSpPr>
+        <p:spPr>
+          <a:xfrm>
+            <a:off x="5728974" y="-91655"/>
+            <a:ext cx="1211434" cy="830997"/>
+          </a:xfrm>
+          <a:prstGeom prst="rect">
+            <a:avLst/>
+          </a:prstGeom>
+          <a:noFill/>
+          <a:effectLst>
+            <a:outerShdw blurRad="190500" dist="38100" algn="l" rotWithShape="0">
+              <a:prstClr val="black">
+                <a:alpha val="28000"/>
+              </a:prstClr>
+            </a:outerShdw>
+            <a:softEdge rad="127000"/>
+          </a:effectLst>
+          <a:scene3d>
+            <a:camera prst="isometricRightUp">
+              <a:rot lat="1800000" lon="20400000" rev="600000"/>
+            </a:camera>
+            <a:lightRig rig="threePt" dir="t"/>
+          </a:scene3d>
+        </p:spPr>
+        <p:txBody>
+          <a:bodyPr wrap="square" rtlCol="0">
+            <a:spAutoFit/>
+          </a:bodyPr>
+          <a:lstStyle/>
+          <a:p>
+            <a:r>
+              <a:rPr lang="en-US" sz="4800" b="1" dirty="0">
+                <a:solidFill>
+                  <a:schemeClr val="bg1"/>
+                </a:solidFill>
+                <a:latin typeface="ADLaM Display" panose="02010000000000000000" pitchFamily="2" charset="0"/>
+                <a:ea typeface="ADLaM Display" panose="02010000000000000000" pitchFamily="2" charset="0"/>
+                <a:cs typeface="ADLaM Display" panose="02010000000000000000" pitchFamily="2" charset="0"/>
+              </a:rPr>
+              <a:t>4</a:t>
+            </a:r>
+          </a:p>
+        </p:txBody>
+      </p:sp>
+      <p:sp>
+        <p:nvSpPr>
+          <p:cNvPr id="30" name="TextBox 29">
+            <a:extLst>
+              <a:ext uri="{FF2B5EF4-FFF2-40B4-BE49-F238E27FC236}">
+                <a16:creationId xmlns:a16="http://schemas.microsoft.com/office/drawing/2014/main" id="{57967605-DD47-40B7-0E9E-5BB605DC1CDB}"/>
+              </a:ext>
+            </a:extLst>
+          </p:cNvPr>
+          <p:cNvSpPr txBox="1"/>
+          <p:nvPr/>
+        </p:nvSpPr>
+        <p:spPr>
+          <a:xfrm>
+            <a:off x="8243335" y="330954"/>
+            <a:ext cx="1211434" cy="1323439"/>
+          </a:xfrm>
+          <a:prstGeom prst="rect">
+            <a:avLst/>
+          </a:prstGeom>
+          <a:noFill/>
+          <a:effectLst>
+            <a:outerShdw blurRad="190500" dist="38100" algn="l" rotWithShape="0">
+              <a:prstClr val="black">
+                <a:alpha val="28000"/>
+              </a:prstClr>
+            </a:outerShdw>
+            <a:softEdge rad="127000"/>
+          </a:effectLst>
+          <a:scene3d>
+            <a:camera prst="isometricRightUp">
+              <a:rot lat="9000000" lon="12000000" rev="9000000"/>
+            </a:camera>
+            <a:lightRig rig="threePt" dir="t"/>
+          </a:scene3d>
+        </p:spPr>
+        <p:txBody>
+          <a:bodyPr wrap="square" rtlCol="0">
+            <a:spAutoFit/>
+          </a:bodyPr>
+          <a:lstStyle/>
+          <a:p>
+            <a:r>
+              <a:rPr lang="en-US" sz="8000" b="1" dirty="0">
+                <a:solidFill>
+                  <a:schemeClr val="bg1"/>
+                </a:solidFill>
+                <a:latin typeface="ADLaM Display" panose="02010000000000000000" pitchFamily="2" charset="0"/>
+                <a:ea typeface="ADLaM Display" panose="02010000000000000000" pitchFamily="2" charset="0"/>
+                <a:cs typeface="ADLaM Display" panose="02010000000000000000" pitchFamily="2" charset="0"/>
+              </a:rPr>
+              <a:t>5</a:t>
+            </a:r>
+          </a:p>
+        </p:txBody>
+      </p:sp>
+    </p:spTree>
+    <p:extLst>
+      <p:ext uri="{BB962C8B-B14F-4D97-AF65-F5344CB8AC3E}">
+        <p14:creationId xmlns:p14="http://schemas.microsoft.com/office/powerpoint/2010/main" val="4117985637"/>
       </p:ext>
     </p:extLst>
   </p:cSld>

</xml_diff>

<commit_message>
[add] ui and logic game screen
</commit_message>
<xml_diff>
--- a/design.pptx
+++ b/design.pptx
@@ -266,7 +266,7 @@
           <a:p>
             <a:fld id="{9FB2975D-5889-42CE-9021-22540751EAE4}" type="datetimeFigureOut">
               <a:rPr lang="en-US" smtClean="0"/>
-              <a:t>02/27/24</a:t>
+              <a:t>03/16/24</a:t>
             </a:fld>
             <a:endParaRPr lang="en-US"/>
           </a:p>
@@ -464,7 +464,7 @@
           <a:p>
             <a:fld id="{9FB2975D-5889-42CE-9021-22540751EAE4}" type="datetimeFigureOut">
               <a:rPr lang="en-US" smtClean="0"/>
-              <a:t>02/27/24</a:t>
+              <a:t>03/16/24</a:t>
             </a:fld>
             <a:endParaRPr lang="en-US"/>
           </a:p>
@@ -672,7 +672,7 @@
           <a:p>
             <a:fld id="{9FB2975D-5889-42CE-9021-22540751EAE4}" type="datetimeFigureOut">
               <a:rPr lang="en-US" smtClean="0"/>
-              <a:t>02/27/24</a:t>
+              <a:t>03/16/24</a:t>
             </a:fld>
             <a:endParaRPr lang="en-US"/>
           </a:p>
@@ -870,7 +870,7 @@
           <a:p>
             <a:fld id="{9FB2975D-5889-42CE-9021-22540751EAE4}" type="datetimeFigureOut">
               <a:rPr lang="en-US" smtClean="0"/>
-              <a:t>02/27/24</a:t>
+              <a:t>03/16/24</a:t>
             </a:fld>
             <a:endParaRPr lang="en-US"/>
           </a:p>
@@ -1145,7 +1145,7 @@
           <a:p>
             <a:fld id="{9FB2975D-5889-42CE-9021-22540751EAE4}" type="datetimeFigureOut">
               <a:rPr lang="en-US" smtClean="0"/>
-              <a:t>02/27/24</a:t>
+              <a:t>03/16/24</a:t>
             </a:fld>
             <a:endParaRPr lang="en-US"/>
           </a:p>
@@ -1410,7 +1410,7 @@
           <a:p>
             <a:fld id="{9FB2975D-5889-42CE-9021-22540751EAE4}" type="datetimeFigureOut">
               <a:rPr lang="en-US" smtClean="0"/>
-              <a:t>02/27/24</a:t>
+              <a:t>03/16/24</a:t>
             </a:fld>
             <a:endParaRPr lang="en-US"/>
           </a:p>
@@ -1822,7 +1822,7 @@
           <a:p>
             <a:fld id="{9FB2975D-5889-42CE-9021-22540751EAE4}" type="datetimeFigureOut">
               <a:rPr lang="en-US" smtClean="0"/>
-              <a:t>02/27/24</a:t>
+              <a:t>03/16/24</a:t>
             </a:fld>
             <a:endParaRPr lang="en-US"/>
           </a:p>
@@ -1963,7 +1963,7 @@
           <a:p>
             <a:fld id="{9FB2975D-5889-42CE-9021-22540751EAE4}" type="datetimeFigureOut">
               <a:rPr lang="en-US" smtClean="0"/>
-              <a:t>02/27/24</a:t>
+              <a:t>03/16/24</a:t>
             </a:fld>
             <a:endParaRPr lang="en-US"/>
           </a:p>
@@ -2076,7 +2076,7 @@
           <a:p>
             <a:fld id="{9FB2975D-5889-42CE-9021-22540751EAE4}" type="datetimeFigureOut">
               <a:rPr lang="en-US" smtClean="0"/>
-              <a:t>02/27/24</a:t>
+              <a:t>03/16/24</a:t>
             </a:fld>
             <a:endParaRPr lang="en-US"/>
           </a:p>
@@ -2387,7 +2387,7 @@
           <a:p>
             <a:fld id="{9FB2975D-5889-42CE-9021-22540751EAE4}" type="datetimeFigureOut">
               <a:rPr lang="en-US" smtClean="0"/>
-              <a:t>02/27/24</a:t>
+              <a:t>03/16/24</a:t>
             </a:fld>
             <a:endParaRPr lang="en-US"/>
           </a:p>
@@ -2675,7 +2675,7 @@
           <a:p>
             <a:fld id="{9FB2975D-5889-42CE-9021-22540751EAE4}" type="datetimeFigureOut">
               <a:rPr lang="en-US" smtClean="0"/>
-              <a:t>02/27/24</a:t>
+              <a:t>03/16/24</a:t>
             </a:fld>
             <a:endParaRPr lang="en-US"/>
           </a:p>
@@ -2916,7 +2916,7 @@
           <a:p>
             <a:fld id="{9FB2975D-5889-42CE-9021-22540751EAE4}" type="datetimeFigureOut">
               <a:rPr lang="en-US" smtClean="0"/>
-              <a:t>02/27/24</a:t>
+              <a:t>03/16/24</a:t>
             </a:fld>
             <a:endParaRPr lang="en-US"/>
           </a:p>
@@ -8657,7 +8657,7 @@
           <a:lstStyle/>
           <a:p>
             <a:pPr algn="ctr"/>
-            <a:endParaRPr lang="en-US"/>
+            <a:endParaRPr lang="en-US" dirty="0"/>
           </a:p>
         </p:txBody>
       </p:sp>

</xml_diff>